<commit_message>
Additional changes to presentation.
</commit_message>
<xml_diff>
--- a/Plugin Presentation.pptx
+++ b/Plugin Presentation.pptx
@@ -3967,7 +3967,11 @@
             </a:r>
             <a:r>
               <a:rPr lang="en-US" dirty="0"/>
-              <a:t> repository with tutorial and final project tutorial: </a:t>
+              <a:t> repository with tutorial and </a:t>
+            </a:r>
+            <a:r>
+              <a:rPr lang="en-US"/>
+              <a:t>final project: </a:t>
             </a:r>
             <a:r>
               <a:rPr lang="en-US" dirty="0">
@@ -4041,6 +4045,114 @@
               <a:rPr lang="en-US" dirty="0"/>
               <a:t> </a:t>
             </a:r>
+          </a:p>
+        </p:txBody>
+      </p:sp>
+      <p:sp>
+        <p:nvSpPr>
+          <p:cNvPr id="3" name="Rectangle 2">
+            <a:extLst>
+              <a:ext uri="{FF2B5EF4-FFF2-40B4-BE49-F238E27FC236}">
+                <a16:creationId xmlns:a16="http://schemas.microsoft.com/office/drawing/2014/main" id="{809363A6-8291-4D04-9D0E-8BB49D0BCE32}"/>
+              </a:ext>
+            </a:extLst>
+          </p:cNvPr>
+          <p:cNvSpPr/>
+          <p:nvPr/>
+        </p:nvSpPr>
+        <p:spPr>
+          <a:xfrm>
+            <a:off x="1091953" y="2228295"/>
+            <a:ext cx="3400148" cy="479394"/>
+          </a:xfrm>
+          <a:prstGeom prst="rect">
+            <a:avLst/>
+          </a:prstGeom>
+          <a:solidFill>
+            <a:schemeClr val="accent4">
+              <a:alpha val="20000"/>
+            </a:schemeClr>
+          </a:solidFill>
+          <a:ln>
+            <a:noFill/>
+          </a:ln>
+        </p:spPr>
+        <p:style>
+          <a:lnRef idx="2">
+            <a:schemeClr val="accent4">
+              <a:shade val="50000"/>
+            </a:schemeClr>
+          </a:lnRef>
+          <a:fillRef idx="1">
+            <a:schemeClr val="accent4"/>
+          </a:fillRef>
+          <a:effectRef idx="0">
+            <a:schemeClr val="accent4"/>
+          </a:effectRef>
+          <a:fontRef idx="minor">
+            <a:schemeClr val="lt1"/>
+          </a:fontRef>
+        </p:style>
+        <p:txBody>
+          <a:bodyPr rtlCol="0" anchor="ctr"/>
+          <a:lstStyle/>
+          <a:p>
+            <a:pPr algn="ctr"/>
+            <a:endParaRPr lang="en-US"/>
+          </a:p>
+        </p:txBody>
+      </p:sp>
+      <p:sp>
+        <p:nvSpPr>
+          <p:cNvPr id="4" name="Rectangle 3">
+            <a:extLst>
+              <a:ext uri="{FF2B5EF4-FFF2-40B4-BE49-F238E27FC236}">
+                <a16:creationId xmlns:a16="http://schemas.microsoft.com/office/drawing/2014/main" id="{5C485D59-7DB3-4623-9885-3006B48D2A01}"/>
+              </a:ext>
+            </a:extLst>
+          </p:cNvPr>
+          <p:cNvSpPr/>
+          <p:nvPr/>
+        </p:nvSpPr>
+        <p:spPr>
+          <a:xfrm>
+            <a:off x="2792027" y="5260082"/>
+            <a:ext cx="3161301" cy="479394"/>
+          </a:xfrm>
+          <a:prstGeom prst="rect">
+            <a:avLst/>
+          </a:prstGeom>
+          <a:solidFill>
+            <a:schemeClr val="accent4">
+              <a:alpha val="20000"/>
+            </a:schemeClr>
+          </a:solidFill>
+          <a:ln>
+            <a:noFill/>
+          </a:ln>
+        </p:spPr>
+        <p:style>
+          <a:lnRef idx="2">
+            <a:schemeClr val="accent4">
+              <a:shade val="50000"/>
+            </a:schemeClr>
+          </a:lnRef>
+          <a:fillRef idx="1">
+            <a:schemeClr val="accent4"/>
+          </a:fillRef>
+          <a:effectRef idx="0">
+            <a:schemeClr val="accent4"/>
+          </a:effectRef>
+          <a:fontRef idx="minor">
+            <a:schemeClr val="lt1"/>
+          </a:fontRef>
+        </p:style>
+        <p:txBody>
+          <a:bodyPr rtlCol="0" anchor="ctr"/>
+          <a:lstStyle/>
+          <a:p>
+            <a:pPr algn="ctr"/>
+            <a:endParaRPr lang="en-US"/>
           </a:p>
         </p:txBody>
       </p:sp>
@@ -4074,200 +4186,12 @@
           <a:chExt cx="0" cy="0"/>
         </a:xfrm>
       </p:grpSpPr>
-      <p:sp>
-        <p:nvSpPr>
-          <p:cNvPr id="5" name="TextBox 4">
-            <a:extLst>
-              <a:ext uri="{FF2B5EF4-FFF2-40B4-BE49-F238E27FC236}">
-                <a16:creationId xmlns:a16="http://schemas.microsoft.com/office/drawing/2014/main" id="{82F5DE53-1CE9-4579-BFDF-7F8F1D7245F6}"/>
-              </a:ext>
-            </a:extLst>
-          </p:cNvPr>
-          <p:cNvSpPr txBox="1"/>
-          <p:nvPr/>
-        </p:nvSpPr>
-        <p:spPr>
-          <a:xfrm>
-            <a:off x="6241409" y="310393"/>
-            <a:ext cx="5662569" cy="6463308"/>
-          </a:xfrm>
-          <a:prstGeom prst="rect">
-            <a:avLst/>
-          </a:prstGeom>
-          <a:noFill/>
-        </p:spPr>
-        <p:txBody>
-          <a:bodyPr wrap="square" rtlCol="0">
-            <a:spAutoFit/>
-          </a:bodyPr>
-          <a:lstStyle/>
-          <a:p>
-            <a:pPr marL="342900" indent="-342900">
-              <a:buFont typeface="+mj-lt"/>
-              <a:buAutoNum type="arabicPeriod"/>
-            </a:pPr>
-            <a:r>
-              <a:rPr lang="en-US" dirty="0"/>
-              <a:t>using as a declaration: like a shortcut to access anything in the System namespace including primitives such as </a:t>
-            </a:r>
-            <a:r>
-              <a:rPr lang="en-US" i="1" dirty="0"/>
-              <a:t>string</a:t>
-            </a:r>
-            <a:r>
-              <a:rPr lang="en-US" dirty="0"/>
-              <a:t>, </a:t>
-            </a:r>
-            <a:r>
-              <a:rPr lang="en-US" i="1" dirty="0"/>
-              <a:t>int</a:t>
-            </a:r>
-            <a:r>
-              <a:rPr lang="en-US" dirty="0"/>
-              <a:t>, </a:t>
-            </a:r>
-            <a:r>
-              <a:rPr lang="en-US" i="1" dirty="0"/>
-              <a:t>double</a:t>
-            </a:r>
-            <a:endParaRPr lang="en-US" dirty="0"/>
-          </a:p>
-          <a:p>
-            <a:pPr marL="342900" indent="-342900">
-              <a:buFont typeface="+mj-lt"/>
-              <a:buAutoNum type="arabicPeriod"/>
-            </a:pPr>
-            <a:r>
-              <a:rPr lang="en-US" dirty="0"/>
-              <a:t>Namespace: used to organize and separate code into “containers.” In C# the default is for code in a folder to use the name of the folder as the namespace.</a:t>
-            </a:r>
-          </a:p>
-          <a:p>
-            <a:pPr marL="342900" indent="-342900">
-              <a:buFont typeface="+mj-lt"/>
-              <a:buAutoNum type="arabicPeriod"/>
-            </a:pPr>
-            <a:r>
-              <a:rPr lang="en-US" dirty="0"/>
-              <a:t>Class: a blueprint of a specific object that carries data and/or functionality that object should have.</a:t>
-            </a:r>
-          </a:p>
-          <a:p>
-            <a:pPr marL="342900" indent="-342900">
-              <a:buFont typeface="+mj-lt"/>
-              <a:buAutoNum type="arabicPeriod"/>
-            </a:pPr>
-            <a:r>
-              <a:rPr lang="en-US" dirty="0"/>
-              <a:t>Constructor: a way to initialize an object to a certain state, usually by passing in objects or data to the parameters (if present).</a:t>
-            </a:r>
-          </a:p>
-          <a:p>
-            <a:pPr marL="342900" indent="-342900">
-              <a:buFont typeface="+mj-lt"/>
-              <a:buAutoNum type="arabicPeriod"/>
-            </a:pPr>
-            <a:r>
-              <a:rPr lang="en-US" dirty="0"/>
-              <a:t>Method (void): method that does something but returns void (i.e. does not return a value).</a:t>
-            </a:r>
-          </a:p>
-          <a:p>
-            <a:pPr marL="342900" indent="-342900">
-              <a:buFont typeface="+mj-lt"/>
-              <a:buAutoNum type="arabicPeriod"/>
-            </a:pPr>
-            <a:r>
-              <a:rPr lang="en-US" dirty="0"/>
-              <a:t>Method (int): method that returns an </a:t>
-            </a:r>
-            <a:r>
-              <a:rPr lang="en-US" i="1" dirty="0"/>
-              <a:t>int </a:t>
-            </a:r>
-            <a:r>
-              <a:rPr lang="en-US" dirty="0"/>
-              <a:t>value. Here, two </a:t>
-            </a:r>
-            <a:r>
-              <a:rPr lang="en-US" i="1" dirty="0"/>
-              <a:t>int </a:t>
-            </a:r>
-            <a:r>
-              <a:rPr lang="en-US" dirty="0"/>
-              <a:t>requirements must be passed into the method, which then adds them and returns the sum.</a:t>
-            </a:r>
-          </a:p>
-          <a:p>
-            <a:pPr marL="342900" indent="-342900">
-              <a:buFont typeface="+mj-lt"/>
-              <a:buAutoNum type="arabicPeriod"/>
-            </a:pPr>
-            <a:r>
-              <a:rPr lang="en-US" dirty="0"/>
-              <a:t>Statement: a line of code that performs some operation. Statements in C# are terminated by ;</a:t>
-            </a:r>
-          </a:p>
-          <a:p>
-            <a:pPr marL="342900" indent="-342900">
-              <a:buFont typeface="+mj-lt"/>
-              <a:buAutoNum type="arabicPeriod"/>
-            </a:pPr>
-            <a:r>
-              <a:rPr lang="en-US" dirty="0"/>
-              <a:t>Brackets: curly brackets designate start and end of code blocks, such as namespace, class, and methods. Are also used within methods for some statements such as </a:t>
-            </a:r>
-            <a:r>
-              <a:rPr lang="en-US" i="1" dirty="0"/>
-              <a:t>if/else</a:t>
-            </a:r>
-            <a:r>
-              <a:rPr lang="en-US" dirty="0"/>
-              <a:t>, </a:t>
-            </a:r>
-            <a:r>
-              <a:rPr lang="en-US" i="1" dirty="0"/>
-              <a:t>for</a:t>
-            </a:r>
-            <a:r>
-              <a:rPr lang="en-US" dirty="0"/>
-              <a:t>, </a:t>
-            </a:r>
-            <a:r>
-              <a:rPr lang="en-US" i="1" dirty="0"/>
-              <a:t>foreach</a:t>
-            </a:r>
-            <a:r>
-              <a:rPr lang="en-US" dirty="0"/>
-              <a:t>, and </a:t>
-            </a:r>
-            <a:r>
-              <a:rPr lang="en-US" i="1" dirty="0"/>
-              <a:t>switch</a:t>
-            </a:r>
-            <a:r>
-              <a:rPr lang="en-US" dirty="0"/>
-              <a:t>.</a:t>
-            </a:r>
-          </a:p>
-          <a:p>
-            <a:pPr marL="342900" indent="-342900">
-              <a:buFont typeface="+mj-lt"/>
-              <a:buAutoNum type="arabicPeriod"/>
-            </a:pPr>
-            <a:r>
-              <a:rPr lang="en-US" dirty="0"/>
-              <a:t>Comments: // are used to designate a comment</a:t>
-            </a:r>
-          </a:p>
-        </p:txBody>
-      </p:sp>
       <p:pic>
         <p:nvPicPr>
-          <p:cNvPr id="1030" name="Picture 6">
-            <a:extLst>
-              <a:ext uri="{FF2B5EF4-FFF2-40B4-BE49-F238E27FC236}">
-                <a16:creationId xmlns:a16="http://schemas.microsoft.com/office/drawing/2014/main" id="{A71D9A13-9BC2-4C3A-8786-2320D0EDB2D9}"/>
+          <p:cNvPr id="1026" name="Picture 2">
+            <a:extLst>
+              <a:ext uri="{FF2B5EF4-FFF2-40B4-BE49-F238E27FC236}">
+                <a16:creationId xmlns:a16="http://schemas.microsoft.com/office/drawing/2014/main" id="{830EAC05-0761-432B-80F8-F9E2BC98AF0B}"/>
               </a:ext>
             </a:extLst>
           </p:cNvPr>
@@ -4309,6 +4233,1179 @@
           </a:extLst>
         </p:spPr>
       </p:pic>
+      <p:sp>
+        <p:nvSpPr>
+          <p:cNvPr id="5" name="TextBox 4">
+            <a:extLst>
+              <a:ext uri="{FF2B5EF4-FFF2-40B4-BE49-F238E27FC236}">
+                <a16:creationId xmlns:a16="http://schemas.microsoft.com/office/drawing/2014/main" id="{82F5DE53-1CE9-4579-BFDF-7F8F1D7245F6}"/>
+              </a:ext>
+            </a:extLst>
+          </p:cNvPr>
+          <p:cNvSpPr txBox="1"/>
+          <p:nvPr/>
+        </p:nvSpPr>
+        <p:spPr>
+          <a:xfrm>
+            <a:off x="6241409" y="310393"/>
+            <a:ext cx="5662569" cy="6740307"/>
+          </a:xfrm>
+          <a:prstGeom prst="rect">
+            <a:avLst/>
+          </a:prstGeom>
+          <a:noFill/>
+        </p:spPr>
+        <p:txBody>
+          <a:bodyPr wrap="square" rtlCol="0">
+            <a:spAutoFit/>
+          </a:bodyPr>
+          <a:lstStyle/>
+          <a:p>
+            <a:pPr marL="342900" indent="-342900">
+              <a:buFont typeface="+mj-lt"/>
+              <a:buAutoNum type="arabicPeriod"/>
+            </a:pPr>
+            <a:r>
+              <a:rPr lang="en-US" dirty="0"/>
+              <a:t>using as a declaration: like a shortcut to access anything in the System namespace including primitives such as </a:t>
+            </a:r>
+            <a:r>
+              <a:rPr lang="en-US" i="1" dirty="0"/>
+              <a:t>string</a:t>
+            </a:r>
+            <a:r>
+              <a:rPr lang="en-US" dirty="0"/>
+              <a:t>, </a:t>
+            </a:r>
+            <a:r>
+              <a:rPr lang="en-US" i="1" dirty="0"/>
+              <a:t>int</a:t>
+            </a:r>
+            <a:r>
+              <a:rPr lang="en-US" dirty="0"/>
+              <a:t>, </a:t>
+            </a:r>
+            <a:r>
+              <a:rPr lang="en-US" i="1" dirty="0"/>
+              <a:t>double</a:t>
+            </a:r>
+            <a:endParaRPr lang="en-US" dirty="0"/>
+          </a:p>
+          <a:p>
+            <a:pPr marL="342900" indent="-342900">
+              <a:buFont typeface="+mj-lt"/>
+              <a:buAutoNum type="arabicPeriod"/>
+            </a:pPr>
+            <a:r>
+              <a:rPr lang="en-US" dirty="0"/>
+              <a:t>Namespace: used to organize and separate code into “containers.” In C# the default is for code in a folder to use the name of the folder as the namespace.</a:t>
+            </a:r>
+          </a:p>
+          <a:p>
+            <a:pPr marL="342900" indent="-342900">
+              <a:buFont typeface="+mj-lt"/>
+              <a:buAutoNum type="arabicPeriod"/>
+            </a:pPr>
+            <a:r>
+              <a:rPr lang="en-US" dirty="0"/>
+              <a:t>Brackets: curly brackets designate start and end of code blocks, such as namespace, class, and methods. Are also used within methods for some statements such as </a:t>
+            </a:r>
+            <a:r>
+              <a:rPr lang="en-US" i="1" dirty="0"/>
+              <a:t>if/else</a:t>
+            </a:r>
+            <a:r>
+              <a:rPr lang="en-US" dirty="0"/>
+              <a:t>, </a:t>
+            </a:r>
+            <a:r>
+              <a:rPr lang="en-US" i="1" dirty="0"/>
+              <a:t>for</a:t>
+            </a:r>
+            <a:r>
+              <a:rPr lang="en-US" dirty="0"/>
+              <a:t>, </a:t>
+            </a:r>
+            <a:r>
+              <a:rPr lang="en-US" i="1" dirty="0"/>
+              <a:t>foreach</a:t>
+            </a:r>
+            <a:r>
+              <a:rPr lang="en-US" dirty="0"/>
+              <a:t>, and </a:t>
+            </a:r>
+            <a:r>
+              <a:rPr lang="en-US" i="1" dirty="0"/>
+              <a:t>switch</a:t>
+            </a:r>
+            <a:r>
+              <a:rPr lang="en-US" dirty="0"/>
+              <a:t>.</a:t>
+            </a:r>
+          </a:p>
+          <a:p>
+            <a:pPr marL="342900" indent="-342900">
+              <a:buFont typeface="+mj-lt"/>
+              <a:buAutoNum type="arabicPeriod"/>
+            </a:pPr>
+            <a:r>
+              <a:rPr lang="en-US" dirty="0"/>
+              <a:t>Class: a blueprint of a specific object that carries data and/or functionality that object should have.</a:t>
+            </a:r>
+          </a:p>
+          <a:p>
+            <a:pPr marL="342900" indent="-342900">
+              <a:buFont typeface="+mj-lt"/>
+              <a:buAutoNum type="arabicPeriod"/>
+            </a:pPr>
+            <a:r>
+              <a:rPr lang="en-US" dirty="0"/>
+              <a:t>Constructor: a way to initialize an object to a certain state, usually by passing in objects or data to the parameters (if present).</a:t>
+            </a:r>
+          </a:p>
+          <a:p>
+            <a:pPr marL="342900" indent="-342900">
+              <a:buFont typeface="+mj-lt"/>
+              <a:buAutoNum type="arabicPeriod"/>
+            </a:pPr>
+            <a:r>
+              <a:rPr lang="en-US" dirty="0"/>
+              <a:t>Comments: // are used to designate a comment</a:t>
+            </a:r>
+          </a:p>
+          <a:p>
+            <a:pPr marL="342900" indent="-342900">
+              <a:buFont typeface="+mj-lt"/>
+              <a:buAutoNum type="arabicPeriod"/>
+            </a:pPr>
+            <a:r>
+              <a:rPr lang="en-US" dirty="0"/>
+              <a:t>Method (void): method that does something but does not return a value.</a:t>
+            </a:r>
+          </a:p>
+          <a:p>
+            <a:pPr marL="342900" indent="-342900">
+              <a:buFont typeface="+mj-lt"/>
+              <a:buAutoNum type="arabicPeriod"/>
+            </a:pPr>
+            <a:r>
+              <a:rPr lang="en-US" dirty="0"/>
+              <a:t>Method (int): method that returns an </a:t>
+            </a:r>
+            <a:r>
+              <a:rPr lang="en-US" i="1" dirty="0"/>
+              <a:t>int </a:t>
+            </a:r>
+            <a:r>
+              <a:rPr lang="en-US" dirty="0"/>
+              <a:t>value. Here, two </a:t>
+            </a:r>
+            <a:r>
+              <a:rPr lang="en-US" i="1" dirty="0"/>
+              <a:t>int </a:t>
+            </a:r>
+            <a:r>
+              <a:rPr lang="en-US" dirty="0"/>
+              <a:t>requirements must be passed into the method, which then adds them and returns the sum.</a:t>
+            </a:r>
+          </a:p>
+          <a:p>
+            <a:pPr marL="342900" indent="-342900">
+              <a:buFont typeface="+mj-lt"/>
+              <a:buAutoNum type="arabicPeriod"/>
+            </a:pPr>
+            <a:r>
+              <a:rPr lang="en-US" dirty="0"/>
+              <a:t>Statement: a line of code that performs some operation. Statements in C# are terminated by ;</a:t>
+            </a:r>
+          </a:p>
+          <a:p>
+            <a:pPr marL="342900" indent="-342900">
+              <a:buFont typeface="+mj-lt"/>
+              <a:buAutoNum type="arabicPeriod"/>
+            </a:pPr>
+            <a:endParaRPr lang="en-US" dirty="0"/>
+          </a:p>
+        </p:txBody>
+      </p:sp>
+      <p:sp>
+        <p:nvSpPr>
+          <p:cNvPr id="2" name="Rectangle 1">
+            <a:extLst>
+              <a:ext uri="{FF2B5EF4-FFF2-40B4-BE49-F238E27FC236}">
+                <a16:creationId xmlns:a16="http://schemas.microsoft.com/office/drawing/2014/main" id="{905925D1-1D14-4147-A4A1-27FCFCB1C1B5}"/>
+              </a:ext>
+            </a:extLst>
+          </p:cNvPr>
+          <p:cNvSpPr/>
+          <p:nvPr/>
+        </p:nvSpPr>
+        <p:spPr>
+          <a:xfrm>
+            <a:off x="177553" y="70696"/>
+            <a:ext cx="1553970" cy="435142"/>
+          </a:xfrm>
+          <a:prstGeom prst="rect">
+            <a:avLst/>
+          </a:prstGeom>
+          <a:solidFill>
+            <a:schemeClr val="accent4">
+              <a:alpha val="25000"/>
+            </a:schemeClr>
+          </a:solidFill>
+        </p:spPr>
+        <p:style>
+          <a:lnRef idx="2">
+            <a:schemeClr val="accent4">
+              <a:shade val="50000"/>
+            </a:schemeClr>
+          </a:lnRef>
+          <a:fillRef idx="1">
+            <a:schemeClr val="accent4"/>
+          </a:fillRef>
+          <a:effectRef idx="0">
+            <a:schemeClr val="accent4"/>
+          </a:effectRef>
+          <a:fontRef idx="minor">
+            <a:schemeClr val="lt1"/>
+          </a:fontRef>
+        </p:style>
+        <p:txBody>
+          <a:bodyPr rtlCol="0" anchor="ctr"/>
+          <a:lstStyle/>
+          <a:p>
+            <a:pPr algn="ctr"/>
+            <a:endParaRPr lang="en-US"/>
+          </a:p>
+        </p:txBody>
+      </p:sp>
+      <p:sp>
+        <p:nvSpPr>
+          <p:cNvPr id="6" name="Rectangle 5">
+            <a:extLst>
+              <a:ext uri="{FF2B5EF4-FFF2-40B4-BE49-F238E27FC236}">
+                <a16:creationId xmlns:a16="http://schemas.microsoft.com/office/drawing/2014/main" id="{D45EE58F-0C16-47A5-B238-D9B057EAEE5E}"/>
+              </a:ext>
+            </a:extLst>
+          </p:cNvPr>
+          <p:cNvSpPr/>
+          <p:nvPr/>
+        </p:nvSpPr>
+        <p:spPr>
+          <a:xfrm>
+            <a:off x="177553" y="926731"/>
+            <a:ext cx="2030626" cy="435142"/>
+          </a:xfrm>
+          <a:prstGeom prst="rect">
+            <a:avLst/>
+          </a:prstGeom>
+          <a:solidFill>
+            <a:schemeClr val="accent4">
+              <a:alpha val="25000"/>
+            </a:schemeClr>
+          </a:solidFill>
+        </p:spPr>
+        <p:style>
+          <a:lnRef idx="2">
+            <a:schemeClr val="accent4">
+              <a:shade val="50000"/>
+            </a:schemeClr>
+          </a:lnRef>
+          <a:fillRef idx="1">
+            <a:schemeClr val="accent4"/>
+          </a:fillRef>
+          <a:effectRef idx="0">
+            <a:schemeClr val="accent4"/>
+          </a:effectRef>
+          <a:fontRef idx="minor">
+            <a:schemeClr val="lt1"/>
+          </a:fontRef>
+        </p:style>
+        <p:txBody>
+          <a:bodyPr rtlCol="0" anchor="ctr"/>
+          <a:lstStyle/>
+          <a:p>
+            <a:pPr algn="ctr"/>
+            <a:endParaRPr lang="en-US"/>
+          </a:p>
+        </p:txBody>
+      </p:sp>
+      <p:sp>
+        <p:nvSpPr>
+          <p:cNvPr id="3" name="Rectangle 2">
+            <a:extLst>
+              <a:ext uri="{FF2B5EF4-FFF2-40B4-BE49-F238E27FC236}">
+                <a16:creationId xmlns:a16="http://schemas.microsoft.com/office/drawing/2014/main" id="{5E7E6F68-684C-41D7-BD45-9A6A7B6F3B18}"/>
+              </a:ext>
+            </a:extLst>
+          </p:cNvPr>
+          <p:cNvSpPr/>
+          <p:nvPr/>
+        </p:nvSpPr>
+        <p:spPr>
+          <a:xfrm>
+            <a:off x="177552" y="1361873"/>
+            <a:ext cx="221281" cy="311284"/>
+          </a:xfrm>
+          <a:prstGeom prst="rect">
+            <a:avLst/>
+          </a:prstGeom>
+          <a:solidFill>
+            <a:schemeClr val="accent4">
+              <a:alpha val="25000"/>
+            </a:schemeClr>
+          </a:solidFill>
+        </p:spPr>
+        <p:style>
+          <a:lnRef idx="2">
+            <a:schemeClr val="accent4">
+              <a:shade val="50000"/>
+            </a:schemeClr>
+          </a:lnRef>
+          <a:fillRef idx="1">
+            <a:schemeClr val="accent4"/>
+          </a:fillRef>
+          <a:effectRef idx="0">
+            <a:schemeClr val="accent4"/>
+          </a:effectRef>
+          <a:fontRef idx="minor">
+            <a:schemeClr val="lt1"/>
+          </a:fontRef>
+        </p:style>
+        <p:txBody>
+          <a:bodyPr rtlCol="0" anchor="ctr"/>
+          <a:lstStyle/>
+          <a:p>
+            <a:pPr algn="ctr"/>
+            <a:endParaRPr lang="en-US"/>
+          </a:p>
+        </p:txBody>
+      </p:sp>
+      <p:sp>
+        <p:nvSpPr>
+          <p:cNvPr id="7" name="Rectangle 6">
+            <a:extLst>
+              <a:ext uri="{FF2B5EF4-FFF2-40B4-BE49-F238E27FC236}">
+                <a16:creationId xmlns:a16="http://schemas.microsoft.com/office/drawing/2014/main" id="{C391EAA7-92DD-4EAC-9695-29F4284BE051}"/>
+              </a:ext>
+            </a:extLst>
+          </p:cNvPr>
+          <p:cNvSpPr/>
+          <p:nvPr/>
+        </p:nvSpPr>
+        <p:spPr>
+          <a:xfrm>
+            <a:off x="177552" y="6462417"/>
+            <a:ext cx="221281" cy="311284"/>
+          </a:xfrm>
+          <a:prstGeom prst="rect">
+            <a:avLst/>
+          </a:prstGeom>
+          <a:solidFill>
+            <a:schemeClr val="accent4">
+              <a:alpha val="25000"/>
+            </a:schemeClr>
+          </a:solidFill>
+        </p:spPr>
+        <p:style>
+          <a:lnRef idx="2">
+            <a:schemeClr val="accent4">
+              <a:shade val="50000"/>
+            </a:schemeClr>
+          </a:lnRef>
+          <a:fillRef idx="1">
+            <a:schemeClr val="accent4"/>
+          </a:fillRef>
+          <a:effectRef idx="0">
+            <a:schemeClr val="accent4"/>
+          </a:effectRef>
+          <a:fontRef idx="minor">
+            <a:schemeClr val="lt1"/>
+          </a:fontRef>
+        </p:style>
+        <p:txBody>
+          <a:bodyPr rtlCol="0" anchor="ctr"/>
+          <a:lstStyle/>
+          <a:p>
+            <a:pPr algn="ctr"/>
+            <a:endParaRPr lang="en-US"/>
+          </a:p>
+        </p:txBody>
+      </p:sp>
+      <p:sp>
+        <p:nvSpPr>
+          <p:cNvPr id="9" name="Rectangle 8">
+            <a:extLst>
+              <a:ext uri="{FF2B5EF4-FFF2-40B4-BE49-F238E27FC236}">
+                <a16:creationId xmlns:a16="http://schemas.microsoft.com/office/drawing/2014/main" id="{BBE6F6B9-D6A8-4A2B-93C7-B527FB84B806}"/>
+              </a:ext>
+            </a:extLst>
+          </p:cNvPr>
+          <p:cNvSpPr/>
+          <p:nvPr/>
+        </p:nvSpPr>
+        <p:spPr>
+          <a:xfrm>
+            <a:off x="398833" y="1579444"/>
+            <a:ext cx="1955261" cy="435142"/>
+          </a:xfrm>
+          <a:prstGeom prst="rect">
+            <a:avLst/>
+          </a:prstGeom>
+          <a:solidFill>
+            <a:schemeClr val="accent4">
+              <a:alpha val="25000"/>
+            </a:schemeClr>
+          </a:solidFill>
+        </p:spPr>
+        <p:style>
+          <a:lnRef idx="2">
+            <a:schemeClr val="accent4">
+              <a:shade val="50000"/>
+            </a:schemeClr>
+          </a:lnRef>
+          <a:fillRef idx="1">
+            <a:schemeClr val="accent4"/>
+          </a:fillRef>
+          <a:effectRef idx="0">
+            <a:schemeClr val="accent4"/>
+          </a:effectRef>
+          <a:fontRef idx="minor">
+            <a:schemeClr val="lt1"/>
+          </a:fontRef>
+        </p:style>
+        <p:txBody>
+          <a:bodyPr rtlCol="0" anchor="ctr"/>
+          <a:lstStyle/>
+          <a:p>
+            <a:pPr algn="ctr"/>
+            <a:endParaRPr lang="en-US"/>
+          </a:p>
+        </p:txBody>
+      </p:sp>
+      <p:sp>
+        <p:nvSpPr>
+          <p:cNvPr id="11" name="Rectangle 10">
+            <a:extLst>
+              <a:ext uri="{FF2B5EF4-FFF2-40B4-BE49-F238E27FC236}">
+                <a16:creationId xmlns:a16="http://schemas.microsoft.com/office/drawing/2014/main" id="{4750480A-8998-4508-AA33-85AA9F5D99C8}"/>
+              </a:ext>
+            </a:extLst>
+          </p:cNvPr>
+          <p:cNvSpPr/>
+          <p:nvPr/>
+        </p:nvSpPr>
+        <p:spPr>
+          <a:xfrm>
+            <a:off x="612055" y="2143009"/>
+            <a:ext cx="1596124" cy="435142"/>
+          </a:xfrm>
+          <a:prstGeom prst="rect">
+            <a:avLst/>
+          </a:prstGeom>
+          <a:solidFill>
+            <a:schemeClr val="accent4">
+              <a:alpha val="25000"/>
+            </a:schemeClr>
+          </a:solidFill>
+        </p:spPr>
+        <p:style>
+          <a:lnRef idx="2">
+            <a:schemeClr val="accent4">
+              <a:shade val="50000"/>
+            </a:schemeClr>
+          </a:lnRef>
+          <a:fillRef idx="1">
+            <a:schemeClr val="accent4"/>
+          </a:fillRef>
+          <a:effectRef idx="0">
+            <a:schemeClr val="accent4"/>
+          </a:effectRef>
+          <a:fontRef idx="minor">
+            <a:schemeClr val="lt1"/>
+          </a:fontRef>
+        </p:style>
+        <p:txBody>
+          <a:bodyPr rtlCol="0" anchor="ctr"/>
+          <a:lstStyle/>
+          <a:p>
+            <a:pPr algn="ctr"/>
+            <a:endParaRPr lang="en-US"/>
+          </a:p>
+        </p:txBody>
+      </p:sp>
+      <p:sp>
+        <p:nvSpPr>
+          <p:cNvPr id="13" name="Rectangle 12">
+            <a:extLst>
+              <a:ext uri="{FF2B5EF4-FFF2-40B4-BE49-F238E27FC236}">
+                <a16:creationId xmlns:a16="http://schemas.microsoft.com/office/drawing/2014/main" id="{3F70F296-0263-4649-926B-F70787B1851D}"/>
+              </a:ext>
+            </a:extLst>
+          </p:cNvPr>
+          <p:cNvSpPr/>
+          <p:nvPr/>
+        </p:nvSpPr>
+        <p:spPr>
+          <a:xfrm>
+            <a:off x="835791" y="2772386"/>
+            <a:ext cx="3493018" cy="435142"/>
+          </a:xfrm>
+          <a:prstGeom prst="rect">
+            <a:avLst/>
+          </a:prstGeom>
+          <a:solidFill>
+            <a:schemeClr val="accent4">
+              <a:alpha val="25000"/>
+            </a:schemeClr>
+          </a:solidFill>
+        </p:spPr>
+        <p:style>
+          <a:lnRef idx="2">
+            <a:schemeClr val="accent4">
+              <a:shade val="50000"/>
+            </a:schemeClr>
+          </a:lnRef>
+          <a:fillRef idx="1">
+            <a:schemeClr val="accent4"/>
+          </a:fillRef>
+          <a:effectRef idx="0">
+            <a:schemeClr val="accent4"/>
+          </a:effectRef>
+          <a:fontRef idx="minor">
+            <a:schemeClr val="lt1"/>
+          </a:fontRef>
+        </p:style>
+        <p:txBody>
+          <a:bodyPr rtlCol="0" anchor="ctr"/>
+          <a:lstStyle/>
+          <a:p>
+            <a:pPr algn="ctr"/>
+            <a:endParaRPr lang="en-US"/>
+          </a:p>
+        </p:txBody>
+      </p:sp>
+      <p:sp>
+        <p:nvSpPr>
+          <p:cNvPr id="15" name="Rectangle 14">
+            <a:extLst>
+              <a:ext uri="{FF2B5EF4-FFF2-40B4-BE49-F238E27FC236}">
+                <a16:creationId xmlns:a16="http://schemas.microsoft.com/office/drawing/2014/main" id="{30A7F7DA-DE85-4C8C-A6C8-06D5B6A4F0E1}"/>
+              </a:ext>
+            </a:extLst>
+          </p:cNvPr>
+          <p:cNvSpPr/>
+          <p:nvPr/>
+        </p:nvSpPr>
+        <p:spPr>
+          <a:xfrm>
+            <a:off x="612054" y="3404680"/>
+            <a:ext cx="2880175" cy="435142"/>
+          </a:xfrm>
+          <a:prstGeom prst="rect">
+            <a:avLst/>
+          </a:prstGeom>
+          <a:solidFill>
+            <a:schemeClr val="accent4">
+              <a:alpha val="25000"/>
+            </a:schemeClr>
+          </a:solidFill>
+        </p:spPr>
+        <p:style>
+          <a:lnRef idx="2">
+            <a:schemeClr val="accent4">
+              <a:shade val="50000"/>
+            </a:schemeClr>
+          </a:lnRef>
+          <a:fillRef idx="1">
+            <a:schemeClr val="accent4"/>
+          </a:fillRef>
+          <a:effectRef idx="0">
+            <a:schemeClr val="accent4"/>
+          </a:effectRef>
+          <a:fontRef idx="minor">
+            <a:schemeClr val="lt1"/>
+          </a:fontRef>
+        </p:style>
+        <p:txBody>
+          <a:bodyPr rtlCol="0" anchor="ctr"/>
+          <a:lstStyle/>
+          <a:p>
+            <a:pPr algn="ctr"/>
+            <a:endParaRPr lang="en-US"/>
+          </a:p>
+        </p:txBody>
+      </p:sp>
+      <p:sp>
+        <p:nvSpPr>
+          <p:cNvPr id="17" name="Rectangle 16">
+            <a:extLst>
+              <a:ext uri="{FF2B5EF4-FFF2-40B4-BE49-F238E27FC236}">
+                <a16:creationId xmlns:a16="http://schemas.microsoft.com/office/drawing/2014/main" id="{72969288-9799-43FA-A5FB-106518FE1113}"/>
+              </a:ext>
+            </a:extLst>
+          </p:cNvPr>
+          <p:cNvSpPr/>
+          <p:nvPr/>
+        </p:nvSpPr>
+        <p:spPr>
+          <a:xfrm>
+            <a:off x="612053" y="4842774"/>
+            <a:ext cx="4397691" cy="435142"/>
+          </a:xfrm>
+          <a:prstGeom prst="rect">
+            <a:avLst/>
+          </a:prstGeom>
+          <a:solidFill>
+            <a:schemeClr val="accent4">
+              <a:alpha val="25000"/>
+            </a:schemeClr>
+          </a:solidFill>
+        </p:spPr>
+        <p:style>
+          <a:lnRef idx="2">
+            <a:schemeClr val="accent4">
+              <a:shade val="50000"/>
+            </a:schemeClr>
+          </a:lnRef>
+          <a:fillRef idx="1">
+            <a:schemeClr val="accent4"/>
+          </a:fillRef>
+          <a:effectRef idx="0">
+            <a:schemeClr val="accent4"/>
+          </a:effectRef>
+          <a:fontRef idx="minor">
+            <a:schemeClr val="lt1"/>
+          </a:fontRef>
+        </p:style>
+        <p:txBody>
+          <a:bodyPr rtlCol="0" anchor="ctr"/>
+          <a:lstStyle/>
+          <a:p>
+            <a:pPr algn="ctr"/>
+            <a:endParaRPr lang="en-US"/>
+          </a:p>
+        </p:txBody>
+      </p:sp>
+      <p:sp>
+        <p:nvSpPr>
+          <p:cNvPr id="19" name="Rectangle 18">
+            <a:extLst>
+              <a:ext uri="{FF2B5EF4-FFF2-40B4-BE49-F238E27FC236}">
+                <a16:creationId xmlns:a16="http://schemas.microsoft.com/office/drawing/2014/main" id="{2A84D4B9-0466-4A8B-B8CF-61CDDDFFA6D5}"/>
+              </a:ext>
+            </a:extLst>
+          </p:cNvPr>
+          <p:cNvSpPr/>
+          <p:nvPr/>
+        </p:nvSpPr>
+        <p:spPr>
+          <a:xfrm>
+            <a:off x="835791" y="5476671"/>
+            <a:ext cx="3123366" cy="435142"/>
+          </a:xfrm>
+          <a:prstGeom prst="rect">
+            <a:avLst/>
+          </a:prstGeom>
+          <a:solidFill>
+            <a:schemeClr val="accent4">
+              <a:alpha val="25000"/>
+            </a:schemeClr>
+          </a:solidFill>
+        </p:spPr>
+        <p:style>
+          <a:lnRef idx="2">
+            <a:schemeClr val="accent4">
+              <a:shade val="50000"/>
+            </a:schemeClr>
+          </a:lnRef>
+          <a:fillRef idx="1">
+            <a:schemeClr val="accent4"/>
+          </a:fillRef>
+          <a:effectRef idx="0">
+            <a:schemeClr val="accent4"/>
+          </a:effectRef>
+          <a:fontRef idx="minor">
+            <a:schemeClr val="lt1"/>
+          </a:fontRef>
+        </p:style>
+        <p:txBody>
+          <a:bodyPr rtlCol="0" anchor="ctr"/>
+          <a:lstStyle/>
+          <a:p>
+            <a:pPr algn="ctr"/>
+            <a:endParaRPr lang="en-US"/>
+          </a:p>
+        </p:txBody>
+      </p:sp>
+      <p:sp>
+        <p:nvSpPr>
+          <p:cNvPr id="21" name="Rectangle 20">
+            <a:extLst>
+              <a:ext uri="{FF2B5EF4-FFF2-40B4-BE49-F238E27FC236}">
+                <a16:creationId xmlns:a16="http://schemas.microsoft.com/office/drawing/2014/main" id="{5B9B1D23-2539-4A53-83E4-799EAD15FB9B}"/>
+              </a:ext>
+            </a:extLst>
+          </p:cNvPr>
+          <p:cNvSpPr/>
+          <p:nvPr/>
+        </p:nvSpPr>
+        <p:spPr>
+          <a:xfrm>
+            <a:off x="6241408" y="310393"/>
+            <a:ext cx="5662569" cy="856926"/>
+          </a:xfrm>
+          <a:prstGeom prst="rect">
+            <a:avLst/>
+          </a:prstGeom>
+          <a:noFill/>
+          <a:ln w="38100">
+            <a:solidFill>
+              <a:schemeClr val="accent4"/>
+            </a:solidFill>
+          </a:ln>
+        </p:spPr>
+        <p:style>
+          <a:lnRef idx="2">
+            <a:schemeClr val="accent4">
+              <a:shade val="50000"/>
+            </a:schemeClr>
+          </a:lnRef>
+          <a:fillRef idx="1">
+            <a:schemeClr val="accent4"/>
+          </a:fillRef>
+          <a:effectRef idx="0">
+            <a:schemeClr val="accent4"/>
+          </a:effectRef>
+          <a:fontRef idx="minor">
+            <a:schemeClr val="lt1"/>
+          </a:fontRef>
+        </p:style>
+        <p:txBody>
+          <a:bodyPr rtlCol="0" anchor="ctr"/>
+          <a:lstStyle/>
+          <a:p>
+            <a:pPr algn="ctr"/>
+            <a:endParaRPr lang="en-US"/>
+          </a:p>
+        </p:txBody>
+      </p:sp>
+      <p:sp>
+        <p:nvSpPr>
+          <p:cNvPr id="25" name="Rectangle 24">
+            <a:extLst>
+              <a:ext uri="{FF2B5EF4-FFF2-40B4-BE49-F238E27FC236}">
+                <a16:creationId xmlns:a16="http://schemas.microsoft.com/office/drawing/2014/main" id="{74753D2F-A689-4FFE-9139-EB9535E2BDF8}"/>
+              </a:ext>
+            </a:extLst>
+          </p:cNvPr>
+          <p:cNvSpPr/>
+          <p:nvPr/>
+        </p:nvSpPr>
+        <p:spPr>
+          <a:xfrm>
+            <a:off x="6241407" y="1167319"/>
+            <a:ext cx="5662569" cy="856926"/>
+          </a:xfrm>
+          <a:prstGeom prst="rect">
+            <a:avLst/>
+          </a:prstGeom>
+          <a:noFill/>
+          <a:ln w="38100">
+            <a:solidFill>
+              <a:schemeClr val="accent4"/>
+            </a:solidFill>
+          </a:ln>
+        </p:spPr>
+        <p:style>
+          <a:lnRef idx="2">
+            <a:schemeClr val="accent4">
+              <a:shade val="50000"/>
+            </a:schemeClr>
+          </a:lnRef>
+          <a:fillRef idx="1">
+            <a:schemeClr val="accent4"/>
+          </a:fillRef>
+          <a:effectRef idx="0">
+            <a:schemeClr val="accent4"/>
+          </a:effectRef>
+          <a:fontRef idx="minor">
+            <a:schemeClr val="lt1"/>
+          </a:fontRef>
+        </p:style>
+        <p:txBody>
+          <a:bodyPr rtlCol="0" anchor="ctr"/>
+          <a:lstStyle/>
+          <a:p>
+            <a:pPr algn="ctr"/>
+            <a:endParaRPr lang="en-US"/>
+          </a:p>
+        </p:txBody>
+      </p:sp>
+      <p:sp>
+        <p:nvSpPr>
+          <p:cNvPr id="26" name="Rectangle 25">
+            <a:extLst>
+              <a:ext uri="{FF2B5EF4-FFF2-40B4-BE49-F238E27FC236}">
+                <a16:creationId xmlns:a16="http://schemas.microsoft.com/office/drawing/2014/main" id="{C488B70D-801B-411B-82D8-7B28DB0AFCBC}"/>
+              </a:ext>
+            </a:extLst>
+          </p:cNvPr>
+          <p:cNvSpPr/>
+          <p:nvPr/>
+        </p:nvSpPr>
+        <p:spPr>
+          <a:xfrm>
+            <a:off x="6241405" y="2024244"/>
+            <a:ext cx="5662569" cy="1084715"/>
+          </a:xfrm>
+          <a:prstGeom prst="rect">
+            <a:avLst/>
+          </a:prstGeom>
+          <a:noFill/>
+          <a:ln w="38100">
+            <a:solidFill>
+              <a:schemeClr val="accent4"/>
+            </a:solidFill>
+          </a:ln>
+        </p:spPr>
+        <p:style>
+          <a:lnRef idx="2">
+            <a:schemeClr val="accent4">
+              <a:shade val="50000"/>
+            </a:schemeClr>
+          </a:lnRef>
+          <a:fillRef idx="1">
+            <a:schemeClr val="accent4"/>
+          </a:fillRef>
+          <a:effectRef idx="0">
+            <a:schemeClr val="accent4"/>
+          </a:effectRef>
+          <a:fontRef idx="minor">
+            <a:schemeClr val="lt1"/>
+          </a:fontRef>
+        </p:style>
+        <p:txBody>
+          <a:bodyPr rtlCol="0" anchor="ctr"/>
+          <a:lstStyle/>
+          <a:p>
+            <a:pPr algn="ctr"/>
+            <a:endParaRPr lang="en-US"/>
+          </a:p>
+        </p:txBody>
+      </p:sp>
+      <p:sp>
+        <p:nvSpPr>
+          <p:cNvPr id="27" name="Rectangle 26">
+            <a:extLst>
+              <a:ext uri="{FF2B5EF4-FFF2-40B4-BE49-F238E27FC236}">
+                <a16:creationId xmlns:a16="http://schemas.microsoft.com/office/drawing/2014/main" id="{EC9C2EE3-F99C-42E4-A3BB-756757F97649}"/>
+              </a:ext>
+            </a:extLst>
+          </p:cNvPr>
+          <p:cNvSpPr/>
+          <p:nvPr/>
+        </p:nvSpPr>
+        <p:spPr>
+          <a:xfrm>
+            <a:off x="6241401" y="3108958"/>
+            <a:ext cx="5662569" cy="525782"/>
+          </a:xfrm>
+          <a:prstGeom prst="rect">
+            <a:avLst/>
+          </a:prstGeom>
+          <a:noFill/>
+          <a:ln w="38100">
+            <a:solidFill>
+              <a:schemeClr val="accent4"/>
+            </a:solidFill>
+          </a:ln>
+        </p:spPr>
+        <p:style>
+          <a:lnRef idx="2">
+            <a:schemeClr val="accent4">
+              <a:shade val="50000"/>
+            </a:schemeClr>
+          </a:lnRef>
+          <a:fillRef idx="1">
+            <a:schemeClr val="accent4"/>
+          </a:fillRef>
+          <a:effectRef idx="0">
+            <a:schemeClr val="accent4"/>
+          </a:effectRef>
+          <a:fontRef idx="minor">
+            <a:schemeClr val="lt1"/>
+          </a:fontRef>
+        </p:style>
+        <p:txBody>
+          <a:bodyPr rtlCol="0" anchor="ctr"/>
+          <a:lstStyle/>
+          <a:p>
+            <a:pPr algn="ctr"/>
+            <a:endParaRPr lang="en-US"/>
+          </a:p>
+        </p:txBody>
+      </p:sp>
+      <p:sp>
+        <p:nvSpPr>
+          <p:cNvPr id="28" name="Rectangle 27">
+            <a:extLst>
+              <a:ext uri="{FF2B5EF4-FFF2-40B4-BE49-F238E27FC236}">
+                <a16:creationId xmlns:a16="http://schemas.microsoft.com/office/drawing/2014/main" id="{8AC724ED-E33C-476E-A8D3-DCD85678523D}"/>
+              </a:ext>
+            </a:extLst>
+          </p:cNvPr>
+          <p:cNvSpPr/>
+          <p:nvPr/>
+        </p:nvSpPr>
+        <p:spPr>
+          <a:xfrm>
+            <a:off x="6241401" y="3627196"/>
+            <a:ext cx="5662569" cy="856926"/>
+          </a:xfrm>
+          <a:prstGeom prst="rect">
+            <a:avLst/>
+          </a:prstGeom>
+          <a:noFill/>
+          <a:ln w="38100">
+            <a:solidFill>
+              <a:schemeClr val="accent4"/>
+            </a:solidFill>
+          </a:ln>
+        </p:spPr>
+        <p:style>
+          <a:lnRef idx="2">
+            <a:schemeClr val="accent4">
+              <a:shade val="50000"/>
+            </a:schemeClr>
+          </a:lnRef>
+          <a:fillRef idx="1">
+            <a:schemeClr val="accent4"/>
+          </a:fillRef>
+          <a:effectRef idx="0">
+            <a:schemeClr val="accent4"/>
+          </a:effectRef>
+          <a:fontRef idx="minor">
+            <a:schemeClr val="lt1"/>
+          </a:fontRef>
+        </p:style>
+        <p:txBody>
+          <a:bodyPr rtlCol="0" anchor="ctr"/>
+          <a:lstStyle/>
+          <a:p>
+            <a:pPr algn="ctr"/>
+            <a:endParaRPr lang="en-US"/>
+          </a:p>
+        </p:txBody>
+      </p:sp>
+      <p:sp>
+        <p:nvSpPr>
+          <p:cNvPr id="29" name="Rectangle 28">
+            <a:extLst>
+              <a:ext uri="{FF2B5EF4-FFF2-40B4-BE49-F238E27FC236}">
+                <a16:creationId xmlns:a16="http://schemas.microsoft.com/office/drawing/2014/main" id="{287A0B88-4E57-4E8A-A1D3-A8BFDA1C07E7}"/>
+              </a:ext>
+            </a:extLst>
+          </p:cNvPr>
+          <p:cNvSpPr/>
+          <p:nvPr/>
+        </p:nvSpPr>
+        <p:spPr>
+          <a:xfrm>
+            <a:off x="6241401" y="4484122"/>
+            <a:ext cx="5662569" cy="235331"/>
+          </a:xfrm>
+          <a:prstGeom prst="rect">
+            <a:avLst/>
+          </a:prstGeom>
+          <a:noFill/>
+          <a:ln w="38100">
+            <a:solidFill>
+              <a:schemeClr val="accent4"/>
+            </a:solidFill>
+          </a:ln>
+        </p:spPr>
+        <p:style>
+          <a:lnRef idx="2">
+            <a:schemeClr val="accent4">
+              <a:shade val="50000"/>
+            </a:schemeClr>
+          </a:lnRef>
+          <a:fillRef idx="1">
+            <a:schemeClr val="accent4"/>
+          </a:fillRef>
+          <a:effectRef idx="0">
+            <a:schemeClr val="accent4"/>
+          </a:effectRef>
+          <a:fontRef idx="minor">
+            <a:schemeClr val="lt1"/>
+          </a:fontRef>
+        </p:style>
+        <p:txBody>
+          <a:bodyPr rtlCol="0" anchor="ctr"/>
+          <a:lstStyle/>
+          <a:p>
+            <a:pPr algn="ctr"/>
+            <a:endParaRPr lang="en-US"/>
+          </a:p>
+        </p:txBody>
+      </p:sp>
+      <p:sp>
+        <p:nvSpPr>
+          <p:cNvPr id="30" name="Rectangle 29">
+            <a:extLst>
+              <a:ext uri="{FF2B5EF4-FFF2-40B4-BE49-F238E27FC236}">
+                <a16:creationId xmlns:a16="http://schemas.microsoft.com/office/drawing/2014/main" id="{A916BB19-AF77-41C2-9600-235357EAC102}"/>
+              </a:ext>
+            </a:extLst>
+          </p:cNvPr>
+          <p:cNvSpPr/>
+          <p:nvPr/>
+        </p:nvSpPr>
+        <p:spPr>
+          <a:xfrm>
+            <a:off x="6241401" y="4719453"/>
+            <a:ext cx="5662569" cy="558463"/>
+          </a:xfrm>
+          <a:prstGeom prst="rect">
+            <a:avLst/>
+          </a:prstGeom>
+          <a:noFill/>
+          <a:ln w="38100">
+            <a:solidFill>
+              <a:schemeClr val="accent4"/>
+            </a:solidFill>
+          </a:ln>
+        </p:spPr>
+        <p:style>
+          <a:lnRef idx="2">
+            <a:schemeClr val="accent4">
+              <a:shade val="50000"/>
+            </a:schemeClr>
+          </a:lnRef>
+          <a:fillRef idx="1">
+            <a:schemeClr val="accent4"/>
+          </a:fillRef>
+          <a:effectRef idx="0">
+            <a:schemeClr val="accent4"/>
+          </a:effectRef>
+          <a:fontRef idx="minor">
+            <a:schemeClr val="lt1"/>
+          </a:fontRef>
+        </p:style>
+        <p:txBody>
+          <a:bodyPr rtlCol="0" anchor="ctr"/>
+          <a:lstStyle/>
+          <a:p>
+            <a:pPr algn="ctr"/>
+            <a:endParaRPr lang="en-US"/>
+          </a:p>
+        </p:txBody>
+      </p:sp>
+      <p:sp>
+        <p:nvSpPr>
+          <p:cNvPr id="31" name="Rectangle 30">
+            <a:extLst>
+              <a:ext uri="{FF2B5EF4-FFF2-40B4-BE49-F238E27FC236}">
+                <a16:creationId xmlns:a16="http://schemas.microsoft.com/office/drawing/2014/main" id="{DA8849E3-E80E-4190-BDC3-426375DBDBFB}"/>
+              </a:ext>
+            </a:extLst>
+          </p:cNvPr>
+          <p:cNvSpPr/>
+          <p:nvPr/>
+        </p:nvSpPr>
+        <p:spPr>
+          <a:xfrm>
+            <a:off x="6241400" y="5277916"/>
+            <a:ext cx="5662569" cy="856926"/>
+          </a:xfrm>
+          <a:prstGeom prst="rect">
+            <a:avLst/>
+          </a:prstGeom>
+          <a:noFill/>
+          <a:ln w="38100">
+            <a:solidFill>
+              <a:schemeClr val="accent4"/>
+            </a:solidFill>
+          </a:ln>
+        </p:spPr>
+        <p:style>
+          <a:lnRef idx="2">
+            <a:schemeClr val="accent4">
+              <a:shade val="50000"/>
+            </a:schemeClr>
+          </a:lnRef>
+          <a:fillRef idx="1">
+            <a:schemeClr val="accent4"/>
+          </a:fillRef>
+          <a:effectRef idx="0">
+            <a:schemeClr val="accent4"/>
+          </a:effectRef>
+          <a:fontRef idx="minor">
+            <a:schemeClr val="lt1"/>
+          </a:fontRef>
+        </p:style>
+        <p:txBody>
+          <a:bodyPr rtlCol="0" anchor="ctr"/>
+          <a:lstStyle/>
+          <a:p>
+            <a:pPr algn="ctr"/>
+            <a:endParaRPr lang="en-US"/>
+          </a:p>
+        </p:txBody>
+      </p:sp>
+      <p:sp>
+        <p:nvSpPr>
+          <p:cNvPr id="32" name="Rectangle 31">
+            <a:extLst>
+              <a:ext uri="{FF2B5EF4-FFF2-40B4-BE49-F238E27FC236}">
+                <a16:creationId xmlns:a16="http://schemas.microsoft.com/office/drawing/2014/main" id="{4217C786-18D8-4906-AC49-A87AB5160634}"/>
+              </a:ext>
+            </a:extLst>
+          </p:cNvPr>
+          <p:cNvSpPr/>
+          <p:nvPr/>
+        </p:nvSpPr>
+        <p:spPr>
+          <a:xfrm>
+            <a:off x="6241400" y="6148698"/>
+            <a:ext cx="5662569" cy="625003"/>
+          </a:xfrm>
+          <a:prstGeom prst="rect">
+            <a:avLst/>
+          </a:prstGeom>
+          <a:noFill/>
+          <a:ln w="38100">
+            <a:solidFill>
+              <a:schemeClr val="accent4"/>
+            </a:solidFill>
+          </a:ln>
+        </p:spPr>
+        <p:style>
+          <a:lnRef idx="2">
+            <a:schemeClr val="accent4">
+              <a:shade val="50000"/>
+            </a:schemeClr>
+          </a:lnRef>
+          <a:fillRef idx="1">
+            <a:schemeClr val="accent4"/>
+          </a:fillRef>
+          <a:effectRef idx="0">
+            <a:schemeClr val="accent4"/>
+          </a:effectRef>
+          <a:fontRef idx="minor">
+            <a:schemeClr val="lt1"/>
+          </a:fontRef>
+        </p:style>
+        <p:txBody>
+          <a:bodyPr rtlCol="0" anchor="ctr"/>
+          <a:lstStyle/>
+          <a:p>
+            <a:pPr algn="ctr"/>
+            <a:endParaRPr lang="en-US"/>
+          </a:p>
+        </p:txBody>
+      </p:sp>
     </p:spTree>
     <p:extLst>
       <p:ext uri="{BB962C8B-B14F-4D97-AF65-F5344CB8AC3E}">
@@ -4319,6 +5416,1208 @@
   <p:clrMapOvr>
     <a:masterClrMapping/>
   </p:clrMapOvr>
+  <p:timing>
+    <p:tnLst>
+      <p:par>
+        <p:cTn id="1" dur="indefinite" restart="never" nodeType="tmRoot">
+          <p:childTnLst>
+            <p:seq concurrent="1" nextAc="seek">
+              <p:cTn id="2" dur="indefinite" nodeType="mainSeq">
+                <p:childTnLst>
+                  <p:par>
+                    <p:cTn id="3" fill="hold">
+                      <p:stCondLst>
+                        <p:cond delay="indefinite"/>
+                      </p:stCondLst>
+                      <p:childTnLst>
+                        <p:par>
+                          <p:cTn id="4" fill="hold">
+                            <p:stCondLst>
+                              <p:cond delay="0"/>
+                            </p:stCondLst>
+                            <p:childTnLst>
+                              <p:par>
+                                <p:cTn id="5" presetID="1" presetClass="entr" presetSubtype="0" fill="hold" grpId="0" nodeType="clickEffect">
+                                  <p:stCondLst>
+                                    <p:cond delay="0"/>
+                                  </p:stCondLst>
+                                  <p:childTnLst>
+                                    <p:set>
+                                      <p:cBhvr>
+                                        <p:cTn id="6" dur="1" fill="hold">
+                                          <p:stCondLst>
+                                            <p:cond delay="0"/>
+                                          </p:stCondLst>
+                                        </p:cTn>
+                                        <p:tgtEl>
+                                          <p:spTgt spid="2"/>
+                                        </p:tgtEl>
+                                        <p:attrNameLst>
+                                          <p:attrName>style.visibility</p:attrName>
+                                        </p:attrNameLst>
+                                      </p:cBhvr>
+                                      <p:to>
+                                        <p:strVal val="visible"/>
+                                      </p:to>
+                                    </p:set>
+                                  </p:childTnLst>
+                                </p:cTn>
+                              </p:par>
+                              <p:par>
+                                <p:cTn id="7" presetID="1" presetClass="entr" presetSubtype="0" fill="hold" grpId="0" nodeType="withEffect">
+                                  <p:stCondLst>
+                                    <p:cond delay="0"/>
+                                  </p:stCondLst>
+                                  <p:childTnLst>
+                                    <p:set>
+                                      <p:cBhvr>
+                                        <p:cTn id="8" dur="1" fill="hold">
+                                          <p:stCondLst>
+                                            <p:cond delay="0"/>
+                                          </p:stCondLst>
+                                        </p:cTn>
+                                        <p:tgtEl>
+                                          <p:spTgt spid="21"/>
+                                        </p:tgtEl>
+                                        <p:attrNameLst>
+                                          <p:attrName>style.visibility</p:attrName>
+                                        </p:attrNameLst>
+                                      </p:cBhvr>
+                                      <p:to>
+                                        <p:strVal val="visible"/>
+                                      </p:to>
+                                    </p:set>
+                                  </p:childTnLst>
+                                </p:cTn>
+                              </p:par>
+                            </p:childTnLst>
+                          </p:cTn>
+                        </p:par>
+                      </p:childTnLst>
+                    </p:cTn>
+                  </p:par>
+                  <p:par>
+                    <p:cTn id="9" fill="hold">
+                      <p:stCondLst>
+                        <p:cond delay="indefinite"/>
+                      </p:stCondLst>
+                      <p:childTnLst>
+                        <p:par>
+                          <p:cTn id="10" fill="hold">
+                            <p:stCondLst>
+                              <p:cond delay="0"/>
+                            </p:stCondLst>
+                            <p:childTnLst>
+                              <p:par>
+                                <p:cTn id="11" presetID="1" presetClass="entr" presetSubtype="0" fill="hold" grpId="0" nodeType="clickEffect">
+                                  <p:stCondLst>
+                                    <p:cond delay="0"/>
+                                  </p:stCondLst>
+                                  <p:childTnLst>
+                                    <p:set>
+                                      <p:cBhvr>
+                                        <p:cTn id="12" dur="1" fill="hold">
+                                          <p:stCondLst>
+                                            <p:cond delay="0"/>
+                                          </p:stCondLst>
+                                        </p:cTn>
+                                        <p:tgtEl>
+                                          <p:spTgt spid="6"/>
+                                        </p:tgtEl>
+                                        <p:attrNameLst>
+                                          <p:attrName>style.visibility</p:attrName>
+                                        </p:attrNameLst>
+                                      </p:cBhvr>
+                                      <p:to>
+                                        <p:strVal val="visible"/>
+                                      </p:to>
+                                    </p:set>
+                                  </p:childTnLst>
+                                </p:cTn>
+                              </p:par>
+                              <p:par>
+                                <p:cTn id="13" presetID="1" presetClass="entr" presetSubtype="0" fill="hold" grpId="0" nodeType="withEffect">
+                                  <p:stCondLst>
+                                    <p:cond delay="0"/>
+                                  </p:stCondLst>
+                                  <p:childTnLst>
+                                    <p:set>
+                                      <p:cBhvr>
+                                        <p:cTn id="14" dur="1" fill="hold">
+                                          <p:stCondLst>
+                                            <p:cond delay="0"/>
+                                          </p:stCondLst>
+                                        </p:cTn>
+                                        <p:tgtEl>
+                                          <p:spTgt spid="25"/>
+                                        </p:tgtEl>
+                                        <p:attrNameLst>
+                                          <p:attrName>style.visibility</p:attrName>
+                                        </p:attrNameLst>
+                                      </p:cBhvr>
+                                      <p:to>
+                                        <p:strVal val="visible"/>
+                                      </p:to>
+                                    </p:set>
+                                  </p:childTnLst>
+                                </p:cTn>
+                              </p:par>
+                              <p:par>
+                                <p:cTn id="15" presetID="1" presetClass="exit" presetSubtype="0" fill="hold" grpId="1" nodeType="withEffect">
+                                  <p:stCondLst>
+                                    <p:cond delay="0"/>
+                                  </p:stCondLst>
+                                  <p:childTnLst>
+                                    <p:set>
+                                      <p:cBhvr>
+                                        <p:cTn id="16" dur="1" fill="hold">
+                                          <p:stCondLst>
+                                            <p:cond delay="0"/>
+                                          </p:stCondLst>
+                                        </p:cTn>
+                                        <p:tgtEl>
+                                          <p:spTgt spid="21"/>
+                                        </p:tgtEl>
+                                        <p:attrNameLst>
+                                          <p:attrName>style.visibility</p:attrName>
+                                        </p:attrNameLst>
+                                      </p:cBhvr>
+                                      <p:to>
+                                        <p:strVal val="hidden"/>
+                                      </p:to>
+                                    </p:set>
+                                  </p:childTnLst>
+                                </p:cTn>
+                              </p:par>
+                              <p:par>
+                                <p:cTn id="17" presetID="1" presetClass="exit" presetSubtype="0" fill="hold" grpId="1" nodeType="withEffect">
+                                  <p:stCondLst>
+                                    <p:cond delay="0"/>
+                                  </p:stCondLst>
+                                  <p:childTnLst>
+                                    <p:set>
+                                      <p:cBhvr>
+                                        <p:cTn id="18" dur="1" fill="hold">
+                                          <p:stCondLst>
+                                            <p:cond delay="0"/>
+                                          </p:stCondLst>
+                                        </p:cTn>
+                                        <p:tgtEl>
+                                          <p:spTgt spid="2"/>
+                                        </p:tgtEl>
+                                        <p:attrNameLst>
+                                          <p:attrName>style.visibility</p:attrName>
+                                        </p:attrNameLst>
+                                      </p:cBhvr>
+                                      <p:to>
+                                        <p:strVal val="hidden"/>
+                                      </p:to>
+                                    </p:set>
+                                  </p:childTnLst>
+                                </p:cTn>
+                              </p:par>
+                            </p:childTnLst>
+                          </p:cTn>
+                        </p:par>
+                      </p:childTnLst>
+                    </p:cTn>
+                  </p:par>
+                  <p:par>
+                    <p:cTn id="19" fill="hold">
+                      <p:stCondLst>
+                        <p:cond delay="indefinite"/>
+                      </p:stCondLst>
+                      <p:childTnLst>
+                        <p:par>
+                          <p:cTn id="20" fill="hold">
+                            <p:stCondLst>
+                              <p:cond delay="0"/>
+                            </p:stCondLst>
+                            <p:childTnLst>
+                              <p:par>
+                                <p:cTn id="21" presetID="1" presetClass="entr" presetSubtype="0" fill="hold" grpId="0" nodeType="clickEffect">
+                                  <p:stCondLst>
+                                    <p:cond delay="0"/>
+                                  </p:stCondLst>
+                                  <p:childTnLst>
+                                    <p:set>
+                                      <p:cBhvr>
+                                        <p:cTn id="22" dur="1" fill="hold">
+                                          <p:stCondLst>
+                                            <p:cond delay="0"/>
+                                          </p:stCondLst>
+                                        </p:cTn>
+                                        <p:tgtEl>
+                                          <p:spTgt spid="3"/>
+                                        </p:tgtEl>
+                                        <p:attrNameLst>
+                                          <p:attrName>style.visibility</p:attrName>
+                                        </p:attrNameLst>
+                                      </p:cBhvr>
+                                      <p:to>
+                                        <p:strVal val="visible"/>
+                                      </p:to>
+                                    </p:set>
+                                  </p:childTnLst>
+                                </p:cTn>
+                              </p:par>
+                              <p:par>
+                                <p:cTn id="23" presetID="1" presetClass="entr" presetSubtype="0" fill="hold" grpId="0" nodeType="withEffect">
+                                  <p:stCondLst>
+                                    <p:cond delay="0"/>
+                                  </p:stCondLst>
+                                  <p:childTnLst>
+                                    <p:set>
+                                      <p:cBhvr>
+                                        <p:cTn id="24" dur="1" fill="hold">
+                                          <p:stCondLst>
+                                            <p:cond delay="0"/>
+                                          </p:stCondLst>
+                                        </p:cTn>
+                                        <p:tgtEl>
+                                          <p:spTgt spid="7"/>
+                                        </p:tgtEl>
+                                        <p:attrNameLst>
+                                          <p:attrName>style.visibility</p:attrName>
+                                        </p:attrNameLst>
+                                      </p:cBhvr>
+                                      <p:to>
+                                        <p:strVal val="visible"/>
+                                      </p:to>
+                                    </p:set>
+                                  </p:childTnLst>
+                                </p:cTn>
+                              </p:par>
+                              <p:par>
+                                <p:cTn id="25" presetID="1" presetClass="entr" presetSubtype="0" fill="hold" grpId="0" nodeType="withEffect">
+                                  <p:stCondLst>
+                                    <p:cond delay="0"/>
+                                  </p:stCondLst>
+                                  <p:childTnLst>
+                                    <p:set>
+                                      <p:cBhvr>
+                                        <p:cTn id="26" dur="1" fill="hold">
+                                          <p:stCondLst>
+                                            <p:cond delay="0"/>
+                                          </p:stCondLst>
+                                        </p:cTn>
+                                        <p:tgtEl>
+                                          <p:spTgt spid="26"/>
+                                        </p:tgtEl>
+                                        <p:attrNameLst>
+                                          <p:attrName>style.visibility</p:attrName>
+                                        </p:attrNameLst>
+                                      </p:cBhvr>
+                                      <p:to>
+                                        <p:strVal val="visible"/>
+                                      </p:to>
+                                    </p:set>
+                                  </p:childTnLst>
+                                </p:cTn>
+                              </p:par>
+                              <p:par>
+                                <p:cTn id="27" presetID="1" presetClass="exit" presetSubtype="0" fill="hold" grpId="1" nodeType="withEffect">
+                                  <p:stCondLst>
+                                    <p:cond delay="0"/>
+                                  </p:stCondLst>
+                                  <p:childTnLst>
+                                    <p:set>
+                                      <p:cBhvr>
+                                        <p:cTn id="28" dur="1" fill="hold">
+                                          <p:stCondLst>
+                                            <p:cond delay="0"/>
+                                          </p:stCondLst>
+                                        </p:cTn>
+                                        <p:tgtEl>
+                                          <p:spTgt spid="25"/>
+                                        </p:tgtEl>
+                                        <p:attrNameLst>
+                                          <p:attrName>style.visibility</p:attrName>
+                                        </p:attrNameLst>
+                                      </p:cBhvr>
+                                      <p:to>
+                                        <p:strVal val="hidden"/>
+                                      </p:to>
+                                    </p:set>
+                                  </p:childTnLst>
+                                </p:cTn>
+                              </p:par>
+                              <p:par>
+                                <p:cTn id="29" presetID="1" presetClass="exit" presetSubtype="0" fill="hold" grpId="1" nodeType="withEffect">
+                                  <p:stCondLst>
+                                    <p:cond delay="0"/>
+                                  </p:stCondLst>
+                                  <p:childTnLst>
+                                    <p:set>
+                                      <p:cBhvr>
+                                        <p:cTn id="30" dur="1" fill="hold">
+                                          <p:stCondLst>
+                                            <p:cond delay="0"/>
+                                          </p:stCondLst>
+                                        </p:cTn>
+                                        <p:tgtEl>
+                                          <p:spTgt spid="6"/>
+                                        </p:tgtEl>
+                                        <p:attrNameLst>
+                                          <p:attrName>style.visibility</p:attrName>
+                                        </p:attrNameLst>
+                                      </p:cBhvr>
+                                      <p:to>
+                                        <p:strVal val="hidden"/>
+                                      </p:to>
+                                    </p:set>
+                                  </p:childTnLst>
+                                </p:cTn>
+                              </p:par>
+                            </p:childTnLst>
+                          </p:cTn>
+                        </p:par>
+                      </p:childTnLst>
+                    </p:cTn>
+                  </p:par>
+                  <p:par>
+                    <p:cTn id="31" fill="hold">
+                      <p:stCondLst>
+                        <p:cond delay="indefinite"/>
+                      </p:stCondLst>
+                      <p:childTnLst>
+                        <p:par>
+                          <p:cTn id="32" fill="hold">
+                            <p:stCondLst>
+                              <p:cond delay="0"/>
+                            </p:stCondLst>
+                            <p:childTnLst>
+                              <p:par>
+                                <p:cTn id="33" presetID="1" presetClass="entr" presetSubtype="0" fill="hold" grpId="0" nodeType="clickEffect">
+                                  <p:stCondLst>
+                                    <p:cond delay="0"/>
+                                  </p:stCondLst>
+                                  <p:childTnLst>
+                                    <p:set>
+                                      <p:cBhvr>
+                                        <p:cTn id="34" dur="1" fill="hold">
+                                          <p:stCondLst>
+                                            <p:cond delay="0"/>
+                                          </p:stCondLst>
+                                        </p:cTn>
+                                        <p:tgtEl>
+                                          <p:spTgt spid="9"/>
+                                        </p:tgtEl>
+                                        <p:attrNameLst>
+                                          <p:attrName>style.visibility</p:attrName>
+                                        </p:attrNameLst>
+                                      </p:cBhvr>
+                                      <p:to>
+                                        <p:strVal val="visible"/>
+                                      </p:to>
+                                    </p:set>
+                                  </p:childTnLst>
+                                </p:cTn>
+                              </p:par>
+                              <p:par>
+                                <p:cTn id="35" presetID="1" presetClass="entr" presetSubtype="0" fill="hold" grpId="0" nodeType="withEffect">
+                                  <p:stCondLst>
+                                    <p:cond delay="0"/>
+                                  </p:stCondLst>
+                                  <p:childTnLst>
+                                    <p:set>
+                                      <p:cBhvr>
+                                        <p:cTn id="36" dur="1" fill="hold">
+                                          <p:stCondLst>
+                                            <p:cond delay="0"/>
+                                          </p:stCondLst>
+                                        </p:cTn>
+                                        <p:tgtEl>
+                                          <p:spTgt spid="27"/>
+                                        </p:tgtEl>
+                                        <p:attrNameLst>
+                                          <p:attrName>style.visibility</p:attrName>
+                                        </p:attrNameLst>
+                                      </p:cBhvr>
+                                      <p:to>
+                                        <p:strVal val="visible"/>
+                                      </p:to>
+                                    </p:set>
+                                  </p:childTnLst>
+                                </p:cTn>
+                              </p:par>
+                              <p:par>
+                                <p:cTn id="37" presetID="1" presetClass="exit" presetSubtype="0" fill="hold" grpId="1" nodeType="withEffect">
+                                  <p:stCondLst>
+                                    <p:cond delay="0"/>
+                                  </p:stCondLst>
+                                  <p:childTnLst>
+                                    <p:set>
+                                      <p:cBhvr>
+                                        <p:cTn id="38" dur="1" fill="hold">
+                                          <p:stCondLst>
+                                            <p:cond delay="0"/>
+                                          </p:stCondLst>
+                                        </p:cTn>
+                                        <p:tgtEl>
+                                          <p:spTgt spid="3"/>
+                                        </p:tgtEl>
+                                        <p:attrNameLst>
+                                          <p:attrName>style.visibility</p:attrName>
+                                        </p:attrNameLst>
+                                      </p:cBhvr>
+                                      <p:to>
+                                        <p:strVal val="hidden"/>
+                                      </p:to>
+                                    </p:set>
+                                  </p:childTnLst>
+                                </p:cTn>
+                              </p:par>
+                              <p:par>
+                                <p:cTn id="39" presetID="1" presetClass="exit" presetSubtype="0" fill="hold" grpId="1" nodeType="withEffect">
+                                  <p:stCondLst>
+                                    <p:cond delay="0"/>
+                                  </p:stCondLst>
+                                  <p:childTnLst>
+                                    <p:set>
+                                      <p:cBhvr>
+                                        <p:cTn id="40" dur="1" fill="hold">
+                                          <p:stCondLst>
+                                            <p:cond delay="0"/>
+                                          </p:stCondLst>
+                                        </p:cTn>
+                                        <p:tgtEl>
+                                          <p:spTgt spid="7"/>
+                                        </p:tgtEl>
+                                        <p:attrNameLst>
+                                          <p:attrName>style.visibility</p:attrName>
+                                        </p:attrNameLst>
+                                      </p:cBhvr>
+                                      <p:to>
+                                        <p:strVal val="hidden"/>
+                                      </p:to>
+                                    </p:set>
+                                  </p:childTnLst>
+                                </p:cTn>
+                              </p:par>
+                              <p:par>
+                                <p:cTn id="41" presetID="1" presetClass="exit" presetSubtype="0" fill="hold" grpId="1" nodeType="withEffect">
+                                  <p:stCondLst>
+                                    <p:cond delay="0"/>
+                                  </p:stCondLst>
+                                  <p:childTnLst>
+                                    <p:set>
+                                      <p:cBhvr>
+                                        <p:cTn id="42" dur="1" fill="hold">
+                                          <p:stCondLst>
+                                            <p:cond delay="0"/>
+                                          </p:stCondLst>
+                                        </p:cTn>
+                                        <p:tgtEl>
+                                          <p:spTgt spid="26"/>
+                                        </p:tgtEl>
+                                        <p:attrNameLst>
+                                          <p:attrName>style.visibility</p:attrName>
+                                        </p:attrNameLst>
+                                      </p:cBhvr>
+                                      <p:to>
+                                        <p:strVal val="hidden"/>
+                                      </p:to>
+                                    </p:set>
+                                  </p:childTnLst>
+                                </p:cTn>
+                              </p:par>
+                            </p:childTnLst>
+                          </p:cTn>
+                        </p:par>
+                      </p:childTnLst>
+                    </p:cTn>
+                  </p:par>
+                  <p:par>
+                    <p:cTn id="43" fill="hold">
+                      <p:stCondLst>
+                        <p:cond delay="indefinite"/>
+                      </p:stCondLst>
+                      <p:childTnLst>
+                        <p:par>
+                          <p:cTn id="44" fill="hold">
+                            <p:stCondLst>
+                              <p:cond delay="0"/>
+                            </p:stCondLst>
+                            <p:childTnLst>
+                              <p:par>
+                                <p:cTn id="45" presetID="1" presetClass="entr" presetSubtype="0" fill="hold" grpId="0" nodeType="clickEffect">
+                                  <p:stCondLst>
+                                    <p:cond delay="0"/>
+                                  </p:stCondLst>
+                                  <p:childTnLst>
+                                    <p:set>
+                                      <p:cBhvr>
+                                        <p:cTn id="46" dur="1" fill="hold">
+                                          <p:stCondLst>
+                                            <p:cond delay="0"/>
+                                          </p:stCondLst>
+                                        </p:cTn>
+                                        <p:tgtEl>
+                                          <p:spTgt spid="11"/>
+                                        </p:tgtEl>
+                                        <p:attrNameLst>
+                                          <p:attrName>style.visibility</p:attrName>
+                                        </p:attrNameLst>
+                                      </p:cBhvr>
+                                      <p:to>
+                                        <p:strVal val="visible"/>
+                                      </p:to>
+                                    </p:set>
+                                  </p:childTnLst>
+                                </p:cTn>
+                              </p:par>
+                              <p:par>
+                                <p:cTn id="47" presetID="1" presetClass="entr" presetSubtype="0" fill="hold" grpId="0" nodeType="withEffect">
+                                  <p:stCondLst>
+                                    <p:cond delay="0"/>
+                                  </p:stCondLst>
+                                  <p:childTnLst>
+                                    <p:set>
+                                      <p:cBhvr>
+                                        <p:cTn id="48" dur="1" fill="hold">
+                                          <p:stCondLst>
+                                            <p:cond delay="0"/>
+                                          </p:stCondLst>
+                                        </p:cTn>
+                                        <p:tgtEl>
+                                          <p:spTgt spid="28"/>
+                                        </p:tgtEl>
+                                        <p:attrNameLst>
+                                          <p:attrName>style.visibility</p:attrName>
+                                        </p:attrNameLst>
+                                      </p:cBhvr>
+                                      <p:to>
+                                        <p:strVal val="visible"/>
+                                      </p:to>
+                                    </p:set>
+                                  </p:childTnLst>
+                                </p:cTn>
+                              </p:par>
+                              <p:par>
+                                <p:cTn id="49" presetID="1" presetClass="exit" presetSubtype="0" fill="hold" grpId="1" nodeType="withEffect">
+                                  <p:stCondLst>
+                                    <p:cond delay="0"/>
+                                  </p:stCondLst>
+                                  <p:childTnLst>
+                                    <p:set>
+                                      <p:cBhvr>
+                                        <p:cTn id="50" dur="1" fill="hold">
+                                          <p:stCondLst>
+                                            <p:cond delay="0"/>
+                                          </p:stCondLst>
+                                        </p:cTn>
+                                        <p:tgtEl>
+                                          <p:spTgt spid="9"/>
+                                        </p:tgtEl>
+                                        <p:attrNameLst>
+                                          <p:attrName>style.visibility</p:attrName>
+                                        </p:attrNameLst>
+                                      </p:cBhvr>
+                                      <p:to>
+                                        <p:strVal val="hidden"/>
+                                      </p:to>
+                                    </p:set>
+                                  </p:childTnLst>
+                                </p:cTn>
+                              </p:par>
+                              <p:par>
+                                <p:cTn id="51" presetID="1" presetClass="exit" presetSubtype="0" fill="hold" grpId="1" nodeType="withEffect">
+                                  <p:stCondLst>
+                                    <p:cond delay="0"/>
+                                  </p:stCondLst>
+                                  <p:childTnLst>
+                                    <p:set>
+                                      <p:cBhvr>
+                                        <p:cTn id="52" dur="1" fill="hold">
+                                          <p:stCondLst>
+                                            <p:cond delay="0"/>
+                                          </p:stCondLst>
+                                        </p:cTn>
+                                        <p:tgtEl>
+                                          <p:spTgt spid="27"/>
+                                        </p:tgtEl>
+                                        <p:attrNameLst>
+                                          <p:attrName>style.visibility</p:attrName>
+                                        </p:attrNameLst>
+                                      </p:cBhvr>
+                                      <p:to>
+                                        <p:strVal val="hidden"/>
+                                      </p:to>
+                                    </p:set>
+                                  </p:childTnLst>
+                                </p:cTn>
+                              </p:par>
+                            </p:childTnLst>
+                          </p:cTn>
+                        </p:par>
+                      </p:childTnLst>
+                    </p:cTn>
+                  </p:par>
+                  <p:par>
+                    <p:cTn id="53" fill="hold">
+                      <p:stCondLst>
+                        <p:cond delay="indefinite"/>
+                      </p:stCondLst>
+                      <p:childTnLst>
+                        <p:par>
+                          <p:cTn id="54" fill="hold">
+                            <p:stCondLst>
+                              <p:cond delay="0"/>
+                            </p:stCondLst>
+                            <p:childTnLst>
+                              <p:par>
+                                <p:cTn id="55" presetID="1" presetClass="entr" presetSubtype="0" fill="hold" grpId="0" nodeType="clickEffect">
+                                  <p:stCondLst>
+                                    <p:cond delay="0"/>
+                                  </p:stCondLst>
+                                  <p:childTnLst>
+                                    <p:set>
+                                      <p:cBhvr>
+                                        <p:cTn id="56" dur="1" fill="hold">
+                                          <p:stCondLst>
+                                            <p:cond delay="0"/>
+                                          </p:stCondLst>
+                                        </p:cTn>
+                                        <p:tgtEl>
+                                          <p:spTgt spid="13"/>
+                                        </p:tgtEl>
+                                        <p:attrNameLst>
+                                          <p:attrName>style.visibility</p:attrName>
+                                        </p:attrNameLst>
+                                      </p:cBhvr>
+                                      <p:to>
+                                        <p:strVal val="visible"/>
+                                      </p:to>
+                                    </p:set>
+                                  </p:childTnLst>
+                                </p:cTn>
+                              </p:par>
+                              <p:par>
+                                <p:cTn id="57" presetID="1" presetClass="entr" presetSubtype="0" fill="hold" grpId="0" nodeType="withEffect">
+                                  <p:stCondLst>
+                                    <p:cond delay="0"/>
+                                  </p:stCondLst>
+                                  <p:childTnLst>
+                                    <p:set>
+                                      <p:cBhvr>
+                                        <p:cTn id="58" dur="1" fill="hold">
+                                          <p:stCondLst>
+                                            <p:cond delay="0"/>
+                                          </p:stCondLst>
+                                        </p:cTn>
+                                        <p:tgtEl>
+                                          <p:spTgt spid="29"/>
+                                        </p:tgtEl>
+                                        <p:attrNameLst>
+                                          <p:attrName>style.visibility</p:attrName>
+                                        </p:attrNameLst>
+                                      </p:cBhvr>
+                                      <p:to>
+                                        <p:strVal val="visible"/>
+                                      </p:to>
+                                    </p:set>
+                                  </p:childTnLst>
+                                </p:cTn>
+                              </p:par>
+                              <p:par>
+                                <p:cTn id="59" presetID="1" presetClass="exit" presetSubtype="0" fill="hold" grpId="1" nodeType="withEffect">
+                                  <p:stCondLst>
+                                    <p:cond delay="0"/>
+                                  </p:stCondLst>
+                                  <p:childTnLst>
+                                    <p:set>
+                                      <p:cBhvr>
+                                        <p:cTn id="60" dur="1" fill="hold">
+                                          <p:stCondLst>
+                                            <p:cond delay="0"/>
+                                          </p:stCondLst>
+                                        </p:cTn>
+                                        <p:tgtEl>
+                                          <p:spTgt spid="11"/>
+                                        </p:tgtEl>
+                                        <p:attrNameLst>
+                                          <p:attrName>style.visibility</p:attrName>
+                                        </p:attrNameLst>
+                                      </p:cBhvr>
+                                      <p:to>
+                                        <p:strVal val="hidden"/>
+                                      </p:to>
+                                    </p:set>
+                                  </p:childTnLst>
+                                </p:cTn>
+                              </p:par>
+                              <p:par>
+                                <p:cTn id="61" presetID="1" presetClass="exit" presetSubtype="0" fill="hold" grpId="1" nodeType="withEffect">
+                                  <p:stCondLst>
+                                    <p:cond delay="0"/>
+                                  </p:stCondLst>
+                                  <p:childTnLst>
+                                    <p:set>
+                                      <p:cBhvr>
+                                        <p:cTn id="62" dur="1" fill="hold">
+                                          <p:stCondLst>
+                                            <p:cond delay="0"/>
+                                          </p:stCondLst>
+                                        </p:cTn>
+                                        <p:tgtEl>
+                                          <p:spTgt spid="28"/>
+                                        </p:tgtEl>
+                                        <p:attrNameLst>
+                                          <p:attrName>style.visibility</p:attrName>
+                                        </p:attrNameLst>
+                                      </p:cBhvr>
+                                      <p:to>
+                                        <p:strVal val="hidden"/>
+                                      </p:to>
+                                    </p:set>
+                                  </p:childTnLst>
+                                </p:cTn>
+                              </p:par>
+                            </p:childTnLst>
+                          </p:cTn>
+                        </p:par>
+                      </p:childTnLst>
+                    </p:cTn>
+                  </p:par>
+                  <p:par>
+                    <p:cTn id="63" fill="hold">
+                      <p:stCondLst>
+                        <p:cond delay="indefinite"/>
+                      </p:stCondLst>
+                      <p:childTnLst>
+                        <p:par>
+                          <p:cTn id="64" fill="hold">
+                            <p:stCondLst>
+                              <p:cond delay="0"/>
+                            </p:stCondLst>
+                            <p:childTnLst>
+                              <p:par>
+                                <p:cTn id="65" presetID="1" presetClass="entr" presetSubtype="0" fill="hold" grpId="0" nodeType="clickEffect">
+                                  <p:stCondLst>
+                                    <p:cond delay="0"/>
+                                  </p:stCondLst>
+                                  <p:childTnLst>
+                                    <p:set>
+                                      <p:cBhvr>
+                                        <p:cTn id="66" dur="1" fill="hold">
+                                          <p:stCondLst>
+                                            <p:cond delay="0"/>
+                                          </p:stCondLst>
+                                        </p:cTn>
+                                        <p:tgtEl>
+                                          <p:spTgt spid="15"/>
+                                        </p:tgtEl>
+                                        <p:attrNameLst>
+                                          <p:attrName>style.visibility</p:attrName>
+                                        </p:attrNameLst>
+                                      </p:cBhvr>
+                                      <p:to>
+                                        <p:strVal val="visible"/>
+                                      </p:to>
+                                    </p:set>
+                                  </p:childTnLst>
+                                </p:cTn>
+                              </p:par>
+                              <p:par>
+                                <p:cTn id="67" presetID="1" presetClass="entr" presetSubtype="0" fill="hold" grpId="0" nodeType="withEffect">
+                                  <p:stCondLst>
+                                    <p:cond delay="0"/>
+                                  </p:stCondLst>
+                                  <p:childTnLst>
+                                    <p:set>
+                                      <p:cBhvr>
+                                        <p:cTn id="68" dur="1" fill="hold">
+                                          <p:stCondLst>
+                                            <p:cond delay="0"/>
+                                          </p:stCondLst>
+                                        </p:cTn>
+                                        <p:tgtEl>
+                                          <p:spTgt spid="30"/>
+                                        </p:tgtEl>
+                                        <p:attrNameLst>
+                                          <p:attrName>style.visibility</p:attrName>
+                                        </p:attrNameLst>
+                                      </p:cBhvr>
+                                      <p:to>
+                                        <p:strVal val="visible"/>
+                                      </p:to>
+                                    </p:set>
+                                  </p:childTnLst>
+                                </p:cTn>
+                              </p:par>
+                              <p:par>
+                                <p:cTn id="69" presetID="1" presetClass="exit" presetSubtype="0" fill="hold" grpId="1" nodeType="withEffect">
+                                  <p:stCondLst>
+                                    <p:cond delay="0"/>
+                                  </p:stCondLst>
+                                  <p:childTnLst>
+                                    <p:set>
+                                      <p:cBhvr>
+                                        <p:cTn id="70" dur="1" fill="hold">
+                                          <p:stCondLst>
+                                            <p:cond delay="0"/>
+                                          </p:stCondLst>
+                                        </p:cTn>
+                                        <p:tgtEl>
+                                          <p:spTgt spid="29"/>
+                                        </p:tgtEl>
+                                        <p:attrNameLst>
+                                          <p:attrName>style.visibility</p:attrName>
+                                        </p:attrNameLst>
+                                      </p:cBhvr>
+                                      <p:to>
+                                        <p:strVal val="hidden"/>
+                                      </p:to>
+                                    </p:set>
+                                  </p:childTnLst>
+                                </p:cTn>
+                              </p:par>
+                              <p:par>
+                                <p:cTn id="71" presetID="1" presetClass="exit" presetSubtype="0" fill="hold" grpId="1" nodeType="withEffect">
+                                  <p:stCondLst>
+                                    <p:cond delay="0"/>
+                                  </p:stCondLst>
+                                  <p:childTnLst>
+                                    <p:set>
+                                      <p:cBhvr>
+                                        <p:cTn id="72" dur="1" fill="hold">
+                                          <p:stCondLst>
+                                            <p:cond delay="0"/>
+                                          </p:stCondLst>
+                                        </p:cTn>
+                                        <p:tgtEl>
+                                          <p:spTgt spid="13"/>
+                                        </p:tgtEl>
+                                        <p:attrNameLst>
+                                          <p:attrName>style.visibility</p:attrName>
+                                        </p:attrNameLst>
+                                      </p:cBhvr>
+                                      <p:to>
+                                        <p:strVal val="hidden"/>
+                                      </p:to>
+                                    </p:set>
+                                  </p:childTnLst>
+                                </p:cTn>
+                              </p:par>
+                            </p:childTnLst>
+                          </p:cTn>
+                        </p:par>
+                      </p:childTnLst>
+                    </p:cTn>
+                  </p:par>
+                  <p:par>
+                    <p:cTn id="73" fill="hold">
+                      <p:stCondLst>
+                        <p:cond delay="indefinite"/>
+                      </p:stCondLst>
+                      <p:childTnLst>
+                        <p:par>
+                          <p:cTn id="74" fill="hold">
+                            <p:stCondLst>
+                              <p:cond delay="0"/>
+                            </p:stCondLst>
+                            <p:childTnLst>
+                              <p:par>
+                                <p:cTn id="75" presetID="1" presetClass="entr" presetSubtype="0" fill="hold" grpId="0" nodeType="clickEffect">
+                                  <p:stCondLst>
+                                    <p:cond delay="0"/>
+                                  </p:stCondLst>
+                                  <p:childTnLst>
+                                    <p:set>
+                                      <p:cBhvr>
+                                        <p:cTn id="76" dur="1" fill="hold">
+                                          <p:stCondLst>
+                                            <p:cond delay="0"/>
+                                          </p:stCondLst>
+                                        </p:cTn>
+                                        <p:tgtEl>
+                                          <p:spTgt spid="17"/>
+                                        </p:tgtEl>
+                                        <p:attrNameLst>
+                                          <p:attrName>style.visibility</p:attrName>
+                                        </p:attrNameLst>
+                                      </p:cBhvr>
+                                      <p:to>
+                                        <p:strVal val="visible"/>
+                                      </p:to>
+                                    </p:set>
+                                  </p:childTnLst>
+                                </p:cTn>
+                              </p:par>
+                              <p:par>
+                                <p:cTn id="77" presetID="1" presetClass="entr" presetSubtype="0" fill="hold" grpId="0" nodeType="withEffect">
+                                  <p:stCondLst>
+                                    <p:cond delay="0"/>
+                                  </p:stCondLst>
+                                  <p:childTnLst>
+                                    <p:set>
+                                      <p:cBhvr>
+                                        <p:cTn id="78" dur="1" fill="hold">
+                                          <p:stCondLst>
+                                            <p:cond delay="0"/>
+                                          </p:stCondLst>
+                                        </p:cTn>
+                                        <p:tgtEl>
+                                          <p:spTgt spid="31"/>
+                                        </p:tgtEl>
+                                        <p:attrNameLst>
+                                          <p:attrName>style.visibility</p:attrName>
+                                        </p:attrNameLst>
+                                      </p:cBhvr>
+                                      <p:to>
+                                        <p:strVal val="visible"/>
+                                      </p:to>
+                                    </p:set>
+                                  </p:childTnLst>
+                                </p:cTn>
+                              </p:par>
+                              <p:par>
+                                <p:cTn id="79" presetID="1" presetClass="exit" presetSubtype="0" fill="hold" grpId="1" nodeType="withEffect">
+                                  <p:stCondLst>
+                                    <p:cond delay="0"/>
+                                  </p:stCondLst>
+                                  <p:childTnLst>
+                                    <p:set>
+                                      <p:cBhvr>
+                                        <p:cTn id="80" dur="1" fill="hold">
+                                          <p:stCondLst>
+                                            <p:cond delay="0"/>
+                                          </p:stCondLst>
+                                        </p:cTn>
+                                        <p:tgtEl>
+                                          <p:spTgt spid="30"/>
+                                        </p:tgtEl>
+                                        <p:attrNameLst>
+                                          <p:attrName>style.visibility</p:attrName>
+                                        </p:attrNameLst>
+                                      </p:cBhvr>
+                                      <p:to>
+                                        <p:strVal val="hidden"/>
+                                      </p:to>
+                                    </p:set>
+                                  </p:childTnLst>
+                                </p:cTn>
+                              </p:par>
+                              <p:par>
+                                <p:cTn id="81" presetID="1" presetClass="exit" presetSubtype="0" fill="hold" grpId="1" nodeType="withEffect">
+                                  <p:stCondLst>
+                                    <p:cond delay="0"/>
+                                  </p:stCondLst>
+                                  <p:childTnLst>
+                                    <p:set>
+                                      <p:cBhvr>
+                                        <p:cTn id="82" dur="1" fill="hold">
+                                          <p:stCondLst>
+                                            <p:cond delay="0"/>
+                                          </p:stCondLst>
+                                        </p:cTn>
+                                        <p:tgtEl>
+                                          <p:spTgt spid="15"/>
+                                        </p:tgtEl>
+                                        <p:attrNameLst>
+                                          <p:attrName>style.visibility</p:attrName>
+                                        </p:attrNameLst>
+                                      </p:cBhvr>
+                                      <p:to>
+                                        <p:strVal val="hidden"/>
+                                      </p:to>
+                                    </p:set>
+                                  </p:childTnLst>
+                                </p:cTn>
+                              </p:par>
+                            </p:childTnLst>
+                          </p:cTn>
+                        </p:par>
+                      </p:childTnLst>
+                    </p:cTn>
+                  </p:par>
+                  <p:par>
+                    <p:cTn id="83" fill="hold">
+                      <p:stCondLst>
+                        <p:cond delay="indefinite"/>
+                      </p:stCondLst>
+                      <p:childTnLst>
+                        <p:par>
+                          <p:cTn id="84" fill="hold">
+                            <p:stCondLst>
+                              <p:cond delay="0"/>
+                            </p:stCondLst>
+                            <p:childTnLst>
+                              <p:par>
+                                <p:cTn id="85" presetID="1" presetClass="entr" presetSubtype="0" fill="hold" grpId="0" nodeType="clickEffect">
+                                  <p:stCondLst>
+                                    <p:cond delay="0"/>
+                                  </p:stCondLst>
+                                  <p:childTnLst>
+                                    <p:set>
+                                      <p:cBhvr>
+                                        <p:cTn id="86" dur="1" fill="hold">
+                                          <p:stCondLst>
+                                            <p:cond delay="0"/>
+                                          </p:stCondLst>
+                                        </p:cTn>
+                                        <p:tgtEl>
+                                          <p:spTgt spid="19"/>
+                                        </p:tgtEl>
+                                        <p:attrNameLst>
+                                          <p:attrName>style.visibility</p:attrName>
+                                        </p:attrNameLst>
+                                      </p:cBhvr>
+                                      <p:to>
+                                        <p:strVal val="visible"/>
+                                      </p:to>
+                                    </p:set>
+                                  </p:childTnLst>
+                                </p:cTn>
+                              </p:par>
+                              <p:par>
+                                <p:cTn id="87" presetID="1" presetClass="entr" presetSubtype="0" fill="hold" grpId="0" nodeType="withEffect">
+                                  <p:stCondLst>
+                                    <p:cond delay="0"/>
+                                  </p:stCondLst>
+                                  <p:childTnLst>
+                                    <p:set>
+                                      <p:cBhvr>
+                                        <p:cTn id="88" dur="1" fill="hold">
+                                          <p:stCondLst>
+                                            <p:cond delay="0"/>
+                                          </p:stCondLst>
+                                        </p:cTn>
+                                        <p:tgtEl>
+                                          <p:spTgt spid="32"/>
+                                        </p:tgtEl>
+                                        <p:attrNameLst>
+                                          <p:attrName>style.visibility</p:attrName>
+                                        </p:attrNameLst>
+                                      </p:cBhvr>
+                                      <p:to>
+                                        <p:strVal val="visible"/>
+                                      </p:to>
+                                    </p:set>
+                                  </p:childTnLst>
+                                </p:cTn>
+                              </p:par>
+                              <p:par>
+                                <p:cTn id="89" presetID="1" presetClass="exit" presetSubtype="0" fill="hold" grpId="1" nodeType="withEffect">
+                                  <p:stCondLst>
+                                    <p:cond delay="0"/>
+                                  </p:stCondLst>
+                                  <p:childTnLst>
+                                    <p:set>
+                                      <p:cBhvr>
+                                        <p:cTn id="90" dur="1" fill="hold">
+                                          <p:stCondLst>
+                                            <p:cond delay="0"/>
+                                          </p:stCondLst>
+                                        </p:cTn>
+                                        <p:tgtEl>
+                                          <p:spTgt spid="17"/>
+                                        </p:tgtEl>
+                                        <p:attrNameLst>
+                                          <p:attrName>style.visibility</p:attrName>
+                                        </p:attrNameLst>
+                                      </p:cBhvr>
+                                      <p:to>
+                                        <p:strVal val="hidden"/>
+                                      </p:to>
+                                    </p:set>
+                                  </p:childTnLst>
+                                </p:cTn>
+                              </p:par>
+                              <p:par>
+                                <p:cTn id="91" presetID="1" presetClass="exit" presetSubtype="0" fill="hold" grpId="1" nodeType="withEffect">
+                                  <p:stCondLst>
+                                    <p:cond delay="0"/>
+                                  </p:stCondLst>
+                                  <p:childTnLst>
+                                    <p:set>
+                                      <p:cBhvr>
+                                        <p:cTn id="92" dur="1" fill="hold">
+                                          <p:stCondLst>
+                                            <p:cond delay="0"/>
+                                          </p:stCondLst>
+                                        </p:cTn>
+                                        <p:tgtEl>
+                                          <p:spTgt spid="31"/>
+                                        </p:tgtEl>
+                                        <p:attrNameLst>
+                                          <p:attrName>style.visibility</p:attrName>
+                                        </p:attrNameLst>
+                                      </p:cBhvr>
+                                      <p:to>
+                                        <p:strVal val="hidden"/>
+                                      </p:to>
+                                    </p:set>
+                                  </p:childTnLst>
+                                </p:cTn>
+                              </p:par>
+                            </p:childTnLst>
+                          </p:cTn>
+                        </p:par>
+                      </p:childTnLst>
+                    </p:cTn>
+                  </p:par>
+                </p:childTnLst>
+              </p:cTn>
+              <p:prevCondLst>
+                <p:cond evt="onPrev" delay="0">
+                  <p:tgtEl>
+                    <p:sldTgt/>
+                  </p:tgtEl>
+                </p:cond>
+              </p:prevCondLst>
+              <p:nextCondLst>
+                <p:cond evt="onNext" delay="0">
+                  <p:tgtEl>
+                    <p:sldTgt/>
+                  </p:tgtEl>
+                </p:cond>
+              </p:nextCondLst>
+            </p:seq>
+          </p:childTnLst>
+        </p:cTn>
+      </p:par>
+    </p:tnLst>
+    <p:bldLst>
+      <p:bldP spid="2" grpId="0" animBg="1"/>
+      <p:bldP spid="2" grpId="1" animBg="1"/>
+      <p:bldP spid="6" grpId="0" animBg="1"/>
+      <p:bldP spid="6" grpId="1" animBg="1"/>
+      <p:bldP spid="3" grpId="0" animBg="1"/>
+      <p:bldP spid="3" grpId="1" animBg="1"/>
+      <p:bldP spid="7" grpId="0" animBg="1"/>
+      <p:bldP spid="7" grpId="1" animBg="1"/>
+      <p:bldP spid="9" grpId="0" animBg="1"/>
+      <p:bldP spid="9" grpId="1" animBg="1"/>
+      <p:bldP spid="11" grpId="0" animBg="1"/>
+      <p:bldP spid="11" grpId="1" animBg="1"/>
+      <p:bldP spid="13" grpId="0" animBg="1"/>
+      <p:bldP spid="13" grpId="1" animBg="1"/>
+      <p:bldP spid="15" grpId="0" animBg="1"/>
+      <p:bldP spid="15" grpId="1" animBg="1"/>
+      <p:bldP spid="17" grpId="0" animBg="1"/>
+      <p:bldP spid="17" grpId="1" animBg="1"/>
+      <p:bldP spid="19" grpId="0" animBg="1"/>
+      <p:bldP spid="21" grpId="0" animBg="1"/>
+      <p:bldP spid="21" grpId="1" animBg="1"/>
+      <p:bldP spid="25" grpId="0" animBg="1"/>
+      <p:bldP spid="25" grpId="1" animBg="1"/>
+      <p:bldP spid="26" grpId="0" animBg="1"/>
+      <p:bldP spid="26" grpId="1" animBg="1"/>
+      <p:bldP spid="27" grpId="0" animBg="1"/>
+      <p:bldP spid="27" grpId="1" animBg="1"/>
+      <p:bldP spid="28" grpId="0" animBg="1"/>
+      <p:bldP spid="28" grpId="1" animBg="1"/>
+      <p:bldP spid="29" grpId="0" animBg="1"/>
+      <p:bldP spid="29" grpId="1" animBg="1"/>
+      <p:bldP spid="30" grpId="0" animBg="1"/>
+      <p:bldP spid="30" grpId="1" animBg="1"/>
+      <p:bldP spid="31" grpId="0" animBg="1"/>
+      <p:bldP spid="31" grpId="1" animBg="1"/>
+      <p:bldP spid="32" grpId="0" animBg="1"/>
+    </p:bldLst>
+  </p:timing>
 </p:sld>
 </file>
 

</xml_diff>